<commit_message>
Slides and snippet updates
</commit_message>
<xml_diff>
--- a/Module1-MsGraphMobile/Slides/Module1-MsGraphMobile.pptx
+++ b/Module1-MsGraphMobile/Slides/Module1-MsGraphMobile.pptx
@@ -7,10 +7,10 @@
     <p:sldMasterId id="2147484341" r:id="rId6"/>
   </p:sldMasterIdLst>
   <p:notesMasterIdLst>
-    <p:notesMasterId r:id="rId25"/>
+    <p:notesMasterId r:id="rId24"/>
   </p:notesMasterIdLst>
   <p:handoutMasterIdLst>
-    <p:handoutMasterId r:id="rId26"/>
+    <p:handoutMasterId r:id="rId25"/>
   </p:handoutMasterIdLst>
   <p:sldIdLst>
     <p:sldId id="287" r:id="rId7"/>
@@ -20,17 +20,16 @@
     <p:sldId id="292" r:id="rId11"/>
     <p:sldId id="300" r:id="rId12"/>
     <p:sldId id="299" r:id="rId13"/>
-    <p:sldId id="306" r:id="rId14"/>
-    <p:sldId id="293" r:id="rId15"/>
-    <p:sldId id="302" r:id="rId16"/>
-    <p:sldId id="301" r:id="rId17"/>
-    <p:sldId id="291" r:id="rId18"/>
+    <p:sldId id="293" r:id="rId14"/>
+    <p:sldId id="302" r:id="rId15"/>
+    <p:sldId id="301" r:id="rId16"/>
+    <p:sldId id="291" r:id="rId17"/>
+    <p:sldId id="305" r:id="rId18"/>
     <p:sldId id="303" r:id="rId19"/>
-    <p:sldId id="305" r:id="rId20"/>
-    <p:sldId id="304" r:id="rId21"/>
-    <p:sldId id="297" r:id="rId22"/>
-    <p:sldId id="298" r:id="rId23"/>
-    <p:sldId id="290" r:id="rId24"/>
+    <p:sldId id="304" r:id="rId20"/>
+    <p:sldId id="297" r:id="rId21"/>
+    <p:sldId id="298" r:id="rId22"/>
+    <p:sldId id="290" r:id="rId23"/>
   </p:sldIdLst>
   <p:sldSz cx="12436475" cy="6994525"/>
   <p:notesSz cx="6858000" cy="9144000"/>
@@ -145,7 +144,6 @@
             <p14:sldId id="292"/>
             <p14:sldId id="300"/>
             <p14:sldId id="299"/>
-            <p14:sldId id="306"/>
             <p14:sldId id="293"/>
             <p14:sldId id="302"/>
           </p14:sldIdLst>
@@ -154,8 +152,8 @@
           <p14:sldIdLst>
             <p14:sldId id="301"/>
             <p14:sldId id="291"/>
+            <p14:sldId id="305"/>
             <p14:sldId id="303"/>
-            <p14:sldId id="305"/>
             <p14:sldId id="304"/>
           </p14:sldIdLst>
         </p14:section>
@@ -7159,7 +7157,7 @@
               <a:rPr lang="en-US" smtClean="0">
                 <a:latin typeface="Segoe UI" pitchFamily="34" charset="0"/>
               </a:rPr>
-              <a:t>3/30/2016 2:49 PM</a:t>
+              <a:t>3/31/2016 9:24 AM</a:t>
             </a:fld>
             <a:endParaRPr lang="en-US" dirty="0">
               <a:latin typeface="Segoe UI" pitchFamily="34" charset="0"/>
@@ -7440,7 +7438,7 @@
           <a:p>
             <a:fld id="{38EEC551-8CDA-4EB6-89BB-2A86C9F091C8}" type="datetime8">
               <a:rPr lang="en-US" smtClean="0"/>
-              <a:t>3/30/2016 2:49 PM</a:t>
+              <a:t>3/31/2016 9:24 AM</a:t>
             </a:fld>
             <a:endParaRPr lang="en-US" dirty="0"/>
           </a:p>
@@ -8153,171 +8151,6 @@
           <a:bodyPr/>
           <a:lstStyle/>
           <a:p>
-            <a:r>
-              <a:rPr lang="en-GB" dirty="0"/>
-              <a:t>When you think of the broad range of screen sizes available across all Windows 10 devices, from 4.5” phones up to the 84” Surface Hub, it can seem daunting to create an adaptive UI that will work well across all of</a:t>
-            </a:r>
-            <a:r>
-              <a:rPr lang="en-GB" baseline="0" dirty="0"/>
-              <a:t> these.</a:t>
-            </a:r>
-          </a:p>
-          <a:p>
-            <a:endParaRPr lang="en-GB" baseline="0" dirty="0"/>
-          </a:p>
-          <a:p>
-            <a:r>
-              <a:rPr lang="en-GB" baseline="0" dirty="0"/>
-              <a:t>Our advice is to target a few key scenarios:</a:t>
-            </a:r>
-          </a:p>
-          <a:p>
-            <a:pPr marL="171450" indent="-171450">
-              <a:buFont typeface="Arial" panose="020B0604020202020204" pitchFamily="34" charset="0"/>
-              <a:buChar char="•"/>
-            </a:pPr>
-            <a:r>
-              <a:rPr lang="en-GB" baseline="0" dirty="0"/>
-              <a:t>5” phone in portrait</a:t>
-            </a:r>
-          </a:p>
-          <a:p>
-            <a:pPr marL="171450" indent="-171450">
-              <a:buFont typeface="Arial" panose="020B0604020202020204" pitchFamily="34" charset="0"/>
-              <a:buChar char="•"/>
-            </a:pPr>
-            <a:r>
-              <a:rPr lang="en-GB" baseline="0" dirty="0"/>
-              <a:t>8” tablet in portrait and landscape</a:t>
-            </a:r>
-          </a:p>
-          <a:p>
-            <a:pPr marL="171450" indent="-171450">
-              <a:buFont typeface="Arial" panose="020B0604020202020204" pitchFamily="34" charset="0"/>
-              <a:buChar char="•"/>
-            </a:pPr>
-            <a:r>
-              <a:rPr lang="en-GB" baseline="0" dirty="0"/>
-              <a:t>13” laptop/PC in landscape</a:t>
-            </a:r>
-          </a:p>
-          <a:p>
-            <a:pPr marL="171450" indent="-171450">
-              <a:buFont typeface="Arial" panose="020B0604020202020204" pitchFamily="34" charset="0"/>
-              <a:buChar char="•"/>
-            </a:pPr>
-            <a:endParaRPr lang="en-GB" baseline="0" dirty="0"/>
-          </a:p>
-          <a:p>
-            <a:pPr marL="0" indent="0">
-              <a:buFont typeface="Arial" panose="020B0604020202020204" pitchFamily="34" charset="0"/>
-              <a:buNone/>
-            </a:pPr>
-            <a:r>
-              <a:rPr lang="en-GB" baseline="0" dirty="0"/>
-              <a:t>If you focus on these key targets, and use adaptive layout techniques such as Grid layout and controls that can wrap and flow output such as the </a:t>
-            </a:r>
-            <a:r>
-              <a:rPr lang="en-GB" baseline="0" dirty="0" err="1"/>
-              <a:t>TextBlock</a:t>
-            </a:r>
-            <a:r>
-              <a:rPr lang="en-GB" baseline="0" dirty="0"/>
-              <a:t> with Wrapping set to true, then you should find that you will end up with good results across all the targeted devices and also on those intermediaries.</a:t>
-            </a:r>
-          </a:p>
-          <a:p>
-            <a:pPr marL="0" indent="0">
-              <a:buFont typeface="Arial" panose="020B0604020202020204" pitchFamily="34" charset="0"/>
-              <a:buNone/>
-            </a:pPr>
-            <a:r>
-              <a:rPr lang="en-GB" baseline="0" dirty="0"/>
-              <a:t>You can then target additional screens such as large monitors, Surface Hub or Xbox if it makes sense for your app.</a:t>
-            </a:r>
-          </a:p>
-        </p:txBody>
-      </p:sp>
-      <p:sp>
-        <p:nvSpPr>
-          <p:cNvPr id="4" name="Slide Number Placeholder 3"/>
-          <p:cNvSpPr>
-            <a:spLocks noGrp="1"/>
-          </p:cNvSpPr>
-          <p:nvPr>
-            <p:ph type="sldNum" sz="quarter" idx="10"/>
-          </p:nvPr>
-        </p:nvSpPr>
-        <p:spPr/>
-        <p:txBody>
-          <a:bodyPr/>
-          <a:lstStyle/>
-          <a:p>
-            <a:fld id="{3FAC0659-34C9-4BAF-A7FA-59E8DF72899F}" type="slidenum">
-              <a:rPr lang="en-US" smtClean="0"/>
-              <a:t>8</a:t>
-            </a:fld>
-            <a:endParaRPr lang="en-US"/>
-          </a:p>
-        </p:txBody>
-      </p:sp>
-    </p:spTree>
-    <p:extLst>
-      <p:ext uri="{BB962C8B-B14F-4D97-AF65-F5344CB8AC3E}">
-        <p14:creationId xmlns:p14="http://schemas.microsoft.com/office/powerpoint/2010/main" val="2691511654"/>
-      </p:ext>
-    </p:extLst>
-  </p:cSld>
-  <p:clrMapOvr>
-    <a:masterClrMapping/>
-  </p:clrMapOvr>
-</p:notes>
-</file>
-
-<file path=ppt/notesSlides/notesSlide5.xml><?xml version="1.0" encoding="utf-8"?>
-<p:notes xmlns:a="http://schemas.openxmlformats.org/drawingml/2006/main" xmlns:r="http://schemas.openxmlformats.org/officeDocument/2006/relationships" xmlns:p="http://schemas.openxmlformats.org/presentationml/2006/main">
-  <p:cSld>
-    <p:spTree>
-      <p:nvGrpSpPr>
-        <p:cNvPr id="1" name=""/>
-        <p:cNvGrpSpPr/>
-        <p:nvPr/>
-      </p:nvGrpSpPr>
-      <p:grpSpPr>
-        <a:xfrm>
-          <a:off x="0" y="0"/>
-          <a:ext cx="0" cy="0"/>
-          <a:chOff x="0" y="0"/>
-          <a:chExt cx="0" cy="0"/>
-        </a:xfrm>
-      </p:grpSpPr>
-      <p:sp>
-        <p:nvSpPr>
-          <p:cNvPr id="2" name="Slide Image Placeholder 1"/>
-          <p:cNvSpPr>
-            <a:spLocks noGrp="1" noRot="1" noChangeAspect="1"/>
-          </p:cNvSpPr>
-          <p:nvPr>
-            <p:ph type="sldImg"/>
-          </p:nvPr>
-        </p:nvSpPr>
-        <p:spPr/>
-      </p:sp>
-      <p:sp>
-        <p:nvSpPr>
-          <p:cNvPr id="3" name="Notes Placeholder 2"/>
-          <p:cNvSpPr>
-            <a:spLocks noGrp="1"/>
-          </p:cNvSpPr>
-          <p:nvPr>
-            <p:ph type="body" idx="1"/>
-          </p:nvPr>
-        </p:nvSpPr>
-        <p:spPr/>
-        <p:txBody>
-          <a:bodyPr/>
-          <a:lstStyle/>
-          <a:p>
             <a:endParaRPr lang="en-US" dirty="0"/>
           </a:p>
           <a:p>
@@ -8388,7 +8221,7 @@
           <a:p>
             <a:fld id="{E74353ED-ACB2-44BF-A903-985B0AF962B7}" type="datetime1">
               <a:rPr lang="en-US" smtClean="0"/>
-              <a:t>3/30/2016</a:t>
+              <a:t>3/31/2016</a:t>
             </a:fld>
             <a:endParaRPr lang="en-US" dirty="0"/>
           </a:p>
@@ -8412,7 +8245,7 @@
             <a:fld id="{B4008EB6-D09E-4580-8CD6-DDB14511944F}" type="slidenum">
               <a:rPr lang="en-US" smtClean="0"/>
               <a:pPr/>
-              <a:t>16</a:t>
+              <a:t>15</a:t>
             </a:fld>
             <a:endParaRPr lang="en-US" dirty="0"/>
           </a:p>
@@ -8431,7 +8264,7 @@
 </p:notes>
 </file>
 
-<file path=ppt/notesSlides/notesSlide6.xml><?xml version="1.0" encoding="utf-8"?>
+<file path=ppt/notesSlides/notesSlide5.xml><?xml version="1.0" encoding="utf-8"?>
 <p:notes xmlns:a="http://schemas.openxmlformats.org/drawingml/2006/main" xmlns:r="http://schemas.openxmlformats.org/officeDocument/2006/relationships" xmlns:p="http://schemas.openxmlformats.org/presentationml/2006/main">
   <p:cSld>
     <p:spTree>
@@ -8598,7 +8431,7 @@
           <a:p>
             <a:fld id="{E74353ED-ACB2-44BF-A903-985B0AF962B7}" type="datetime1">
               <a:rPr lang="en-US" smtClean="0"/>
-              <a:t>3/30/2016</a:t>
+              <a:t>3/31/2016</a:t>
             </a:fld>
             <a:endParaRPr lang="en-US" dirty="0"/>
           </a:p>
@@ -8622,7 +8455,7 @@
             <a:fld id="{B4008EB6-D09E-4580-8CD6-DDB14511944F}" type="slidenum">
               <a:rPr lang="en-US" smtClean="0"/>
               <a:pPr/>
-              <a:t>17</a:t>
+              <a:t>16</a:t>
             </a:fld>
             <a:endParaRPr lang="en-US" dirty="0"/>
           </a:p>
@@ -31658,1933 +31491,6 @@
       </p:grpSpPr>
       <p:sp>
         <p:nvSpPr>
-          <p:cNvPr id="38" name="Rectangle 37"/>
-          <p:cNvSpPr/>
-          <p:nvPr/>
-        </p:nvSpPr>
-        <p:spPr bwMode="auto">
-          <a:xfrm>
-            <a:off x="6423705" y="1820862"/>
-            <a:ext cx="1432120" cy="4381500"/>
-          </a:xfrm>
-          <a:prstGeom prst="rect">
-            <a:avLst/>
-          </a:prstGeom>
-          <a:solidFill>
-            <a:srgbClr val="CCCCCC">
-              <a:alpha val="20000"/>
-            </a:srgbClr>
-          </a:solidFill>
-          <a:ln>
-            <a:noFill/>
-            <a:headEnd type="none" w="med" len="med"/>
-            <a:tailEnd type="none" w="med" len="med"/>
-          </a:ln>
-          <a:effectLst/>
-        </p:spPr>
-        <p:style>
-          <a:lnRef idx="1">
-            <a:schemeClr val="accent2"/>
-          </a:lnRef>
-          <a:fillRef idx="3">
-            <a:schemeClr val="accent2"/>
-          </a:fillRef>
-          <a:effectRef idx="2">
-            <a:schemeClr val="accent2"/>
-          </a:effectRef>
-          <a:fontRef idx="minor">
-            <a:schemeClr val="lt1"/>
-          </a:fontRef>
-        </p:style>
-        <p:txBody>
-          <a:bodyPr rot="0" spcFirstLastPara="0" vertOverflow="overflow" horzOverflow="overflow" vert="horz" wrap="square" lIns="182880" tIns="146304" rIns="182880" bIns="146304" numCol="1" spcCol="0" rtlCol="0" fromWordArt="0" anchor="t" anchorCtr="0" forceAA="0" compatLnSpc="1">
-            <a:prstTxWarp prst="textNoShape">
-              <a:avLst/>
-            </a:prstTxWarp>
-            <a:noAutofit/>
-          </a:bodyPr>
-          <a:lstStyle/>
-          <a:p>
-            <a:pPr algn="ctr" defTabSz="932472" fontAlgn="base">
-              <a:lnSpc>
-                <a:spcPct val="90000"/>
-              </a:lnSpc>
-              <a:spcBef>
-                <a:spcPct val="0"/>
-              </a:spcBef>
-              <a:spcAft>
-                <a:spcPct val="0"/>
-              </a:spcAft>
-            </a:pPr>
-            <a:endParaRPr lang="en-US" sz="2400" dirty="0" err="1">
-              <a:gradFill>
-                <a:gsLst>
-                  <a:gs pos="0">
-                    <a:srgbClr val="FFFFFF"/>
-                  </a:gs>
-                  <a:gs pos="100000">
-                    <a:srgbClr val="FFFFFF"/>
-                  </a:gs>
-                </a:gsLst>
-                <a:lin ang="5400000" scaled="0"/>
-              </a:gradFill>
-              <a:ea typeface="Segoe UI" pitchFamily="34" charset="0"/>
-              <a:cs typeface="Segoe UI" pitchFamily="34" charset="0"/>
-            </a:endParaRPr>
-          </a:p>
-        </p:txBody>
-      </p:sp>
-      <p:sp>
-        <p:nvSpPr>
-          <p:cNvPr id="39" name="Rectangle 38"/>
-          <p:cNvSpPr/>
-          <p:nvPr/>
-        </p:nvSpPr>
-        <p:spPr bwMode="auto">
-          <a:xfrm>
-            <a:off x="7886569" y="1820862"/>
-            <a:ext cx="1432120" cy="4381500"/>
-          </a:xfrm>
-          <a:prstGeom prst="rect">
-            <a:avLst/>
-          </a:prstGeom>
-          <a:solidFill>
-            <a:srgbClr val="92D050">
-              <a:alpha val="20000"/>
-            </a:srgbClr>
-          </a:solidFill>
-          <a:ln>
-            <a:noFill/>
-            <a:headEnd type="none" w="med" len="med"/>
-            <a:tailEnd type="none" w="med" len="med"/>
-          </a:ln>
-          <a:effectLst/>
-        </p:spPr>
-        <p:style>
-          <a:lnRef idx="1">
-            <a:schemeClr val="accent2"/>
-          </a:lnRef>
-          <a:fillRef idx="3">
-            <a:schemeClr val="accent2"/>
-          </a:fillRef>
-          <a:effectRef idx="2">
-            <a:schemeClr val="accent2"/>
-          </a:effectRef>
-          <a:fontRef idx="minor">
-            <a:schemeClr val="lt1"/>
-          </a:fontRef>
-        </p:style>
-        <p:txBody>
-          <a:bodyPr rot="0" spcFirstLastPara="0" vertOverflow="overflow" horzOverflow="overflow" vert="horz" wrap="square" lIns="182880" tIns="146304" rIns="182880" bIns="146304" numCol="1" spcCol="0" rtlCol="0" fromWordArt="0" anchor="t" anchorCtr="0" forceAA="0" compatLnSpc="1">
-            <a:prstTxWarp prst="textNoShape">
-              <a:avLst/>
-            </a:prstTxWarp>
-            <a:noAutofit/>
-          </a:bodyPr>
-          <a:lstStyle/>
-          <a:p>
-            <a:pPr algn="ctr" defTabSz="932472" fontAlgn="base">
-              <a:lnSpc>
-                <a:spcPct val="90000"/>
-              </a:lnSpc>
-              <a:spcBef>
-                <a:spcPct val="0"/>
-              </a:spcBef>
-              <a:spcAft>
-                <a:spcPct val="0"/>
-              </a:spcAft>
-            </a:pPr>
-            <a:endParaRPr lang="en-US" sz="2400" dirty="0" err="1">
-              <a:gradFill>
-                <a:gsLst>
-                  <a:gs pos="0">
-                    <a:srgbClr val="FFFFFF"/>
-                  </a:gs>
-                  <a:gs pos="100000">
-                    <a:srgbClr val="FFFFFF"/>
-                  </a:gs>
-                </a:gsLst>
-                <a:lin ang="5400000" scaled="0"/>
-              </a:gradFill>
-              <a:ea typeface="Segoe UI" pitchFamily="34" charset="0"/>
-              <a:cs typeface="Segoe UI" pitchFamily="34" charset="0"/>
-            </a:endParaRPr>
-          </a:p>
-        </p:txBody>
-      </p:sp>
-      <p:sp>
-        <p:nvSpPr>
-          <p:cNvPr id="40" name="Rectangle 39"/>
-          <p:cNvSpPr/>
-          <p:nvPr/>
-        </p:nvSpPr>
-        <p:spPr bwMode="auto">
-          <a:xfrm>
-            <a:off x="9349818" y="1820862"/>
-            <a:ext cx="1432120" cy="4381500"/>
-          </a:xfrm>
-          <a:prstGeom prst="rect">
-            <a:avLst/>
-          </a:prstGeom>
-          <a:solidFill>
-            <a:srgbClr val="364350">
-              <a:alpha val="20000"/>
-            </a:srgbClr>
-          </a:solidFill>
-          <a:ln>
-            <a:noFill/>
-            <a:headEnd type="none" w="med" len="med"/>
-            <a:tailEnd type="none" w="med" len="med"/>
-          </a:ln>
-          <a:effectLst/>
-        </p:spPr>
-        <p:style>
-          <a:lnRef idx="1">
-            <a:schemeClr val="accent2"/>
-          </a:lnRef>
-          <a:fillRef idx="3">
-            <a:schemeClr val="accent2"/>
-          </a:fillRef>
-          <a:effectRef idx="2">
-            <a:schemeClr val="accent2"/>
-          </a:effectRef>
-          <a:fontRef idx="minor">
-            <a:schemeClr val="lt1"/>
-          </a:fontRef>
-        </p:style>
-        <p:txBody>
-          <a:bodyPr rot="0" spcFirstLastPara="0" vertOverflow="overflow" horzOverflow="overflow" vert="horz" wrap="square" lIns="182880" tIns="146304" rIns="182880" bIns="146304" numCol="1" spcCol="0" rtlCol="0" fromWordArt="0" anchor="t" anchorCtr="0" forceAA="0" compatLnSpc="1">
-            <a:prstTxWarp prst="textNoShape">
-              <a:avLst/>
-            </a:prstTxWarp>
-            <a:noAutofit/>
-          </a:bodyPr>
-          <a:lstStyle/>
-          <a:p>
-            <a:pPr algn="ctr" defTabSz="932472" fontAlgn="base">
-              <a:lnSpc>
-                <a:spcPct val="90000"/>
-              </a:lnSpc>
-              <a:spcBef>
-                <a:spcPct val="0"/>
-              </a:spcBef>
-              <a:spcAft>
-                <a:spcPct val="0"/>
-              </a:spcAft>
-            </a:pPr>
-            <a:endParaRPr lang="en-US" sz="2400" dirty="0" err="1">
-              <a:gradFill>
-                <a:gsLst>
-                  <a:gs pos="0">
-                    <a:srgbClr val="FFFFFF"/>
-                  </a:gs>
-                  <a:gs pos="100000">
-                    <a:srgbClr val="FFFFFF"/>
-                  </a:gs>
-                </a:gsLst>
-                <a:lin ang="5400000" scaled="0"/>
-              </a:gradFill>
-              <a:ea typeface="Segoe UI" pitchFamily="34" charset="0"/>
-              <a:cs typeface="Segoe UI" pitchFamily="34" charset="0"/>
-            </a:endParaRPr>
-          </a:p>
-        </p:txBody>
-      </p:sp>
-      <p:sp>
-        <p:nvSpPr>
-          <p:cNvPr id="41" name="Rectangle 40"/>
-          <p:cNvSpPr/>
-          <p:nvPr/>
-        </p:nvSpPr>
-        <p:spPr bwMode="auto">
-          <a:xfrm>
-            <a:off x="10813067" y="1820862"/>
-            <a:ext cx="1432120" cy="4381500"/>
-          </a:xfrm>
-          <a:prstGeom prst="rect">
-            <a:avLst/>
-          </a:prstGeom>
-          <a:solidFill>
-            <a:srgbClr val="2287CA">
-              <a:alpha val="20000"/>
-            </a:srgbClr>
-          </a:solidFill>
-          <a:ln>
-            <a:noFill/>
-            <a:headEnd type="none" w="med" len="med"/>
-            <a:tailEnd type="none" w="med" len="med"/>
-          </a:ln>
-          <a:effectLst/>
-        </p:spPr>
-        <p:style>
-          <a:lnRef idx="1">
-            <a:schemeClr val="accent2"/>
-          </a:lnRef>
-          <a:fillRef idx="3">
-            <a:schemeClr val="accent2"/>
-          </a:fillRef>
-          <a:effectRef idx="2">
-            <a:schemeClr val="accent2"/>
-          </a:effectRef>
-          <a:fontRef idx="minor">
-            <a:schemeClr val="lt1"/>
-          </a:fontRef>
-        </p:style>
-        <p:txBody>
-          <a:bodyPr rot="0" spcFirstLastPara="0" vertOverflow="overflow" horzOverflow="overflow" vert="horz" wrap="square" lIns="182880" tIns="146304" rIns="182880" bIns="146304" numCol="1" spcCol="0" rtlCol="0" fromWordArt="0" anchor="t" anchorCtr="0" forceAA="0" compatLnSpc="1">
-            <a:prstTxWarp prst="textNoShape">
-              <a:avLst/>
-            </a:prstTxWarp>
-            <a:noAutofit/>
-          </a:bodyPr>
-          <a:lstStyle/>
-          <a:p>
-            <a:pPr algn="ctr" defTabSz="932472" fontAlgn="base">
-              <a:lnSpc>
-                <a:spcPct val="90000"/>
-              </a:lnSpc>
-              <a:spcBef>
-                <a:spcPct val="0"/>
-              </a:spcBef>
-              <a:spcAft>
-                <a:spcPct val="0"/>
-              </a:spcAft>
-            </a:pPr>
-            <a:endParaRPr lang="en-US" sz="2400" dirty="0" err="1">
-              <a:gradFill>
-                <a:gsLst>
-                  <a:gs pos="0">
-                    <a:srgbClr val="FFFFFF"/>
-                  </a:gs>
-                  <a:gs pos="100000">
-                    <a:srgbClr val="FFFFFF"/>
-                  </a:gs>
-                </a:gsLst>
-                <a:lin ang="5400000" scaled="0"/>
-              </a:gradFill>
-              <a:ea typeface="Segoe UI" pitchFamily="34" charset="0"/>
-              <a:cs typeface="Segoe UI" pitchFamily="34" charset="0"/>
-            </a:endParaRPr>
-          </a:p>
-        </p:txBody>
-      </p:sp>
-      <p:sp>
-        <p:nvSpPr>
-          <p:cNvPr id="6" name="Rectangle 5"/>
-          <p:cNvSpPr/>
-          <p:nvPr/>
-        </p:nvSpPr>
-        <p:spPr bwMode="auto">
-          <a:xfrm>
-            <a:off x="4960937" y="1820862"/>
-            <a:ext cx="1432120" cy="4381500"/>
-          </a:xfrm>
-          <a:prstGeom prst="rect">
-            <a:avLst/>
-          </a:prstGeom>
-          <a:solidFill>
-            <a:srgbClr val="0093D4">
-              <a:alpha val="20000"/>
-            </a:srgbClr>
-          </a:solidFill>
-          <a:ln>
-            <a:noFill/>
-            <a:headEnd type="none" w="med" len="med"/>
-            <a:tailEnd type="none" w="med" len="med"/>
-          </a:ln>
-          <a:effectLst/>
-        </p:spPr>
-        <p:style>
-          <a:lnRef idx="1">
-            <a:schemeClr val="accent2"/>
-          </a:lnRef>
-          <a:fillRef idx="3">
-            <a:schemeClr val="accent2"/>
-          </a:fillRef>
-          <a:effectRef idx="2">
-            <a:schemeClr val="accent2"/>
-          </a:effectRef>
-          <a:fontRef idx="minor">
-            <a:schemeClr val="lt1"/>
-          </a:fontRef>
-        </p:style>
-        <p:txBody>
-          <a:bodyPr rot="0" spcFirstLastPara="0" vertOverflow="overflow" horzOverflow="overflow" vert="horz" wrap="square" lIns="182880" tIns="146304" rIns="182880" bIns="146304" numCol="1" spcCol="0" rtlCol="0" fromWordArt="0" anchor="t" anchorCtr="0" forceAA="0" compatLnSpc="1">
-            <a:prstTxWarp prst="textNoShape">
-              <a:avLst/>
-            </a:prstTxWarp>
-            <a:noAutofit/>
-          </a:bodyPr>
-          <a:lstStyle/>
-          <a:p>
-            <a:pPr algn="ctr" defTabSz="932472" fontAlgn="base">
-              <a:lnSpc>
-                <a:spcPct val="90000"/>
-              </a:lnSpc>
-              <a:spcBef>
-                <a:spcPct val="0"/>
-              </a:spcBef>
-              <a:spcAft>
-                <a:spcPct val="0"/>
-              </a:spcAft>
-            </a:pPr>
-            <a:endParaRPr lang="en-US" sz="2400" dirty="0" err="1">
-              <a:gradFill>
-                <a:gsLst>
-                  <a:gs pos="0">
-                    <a:srgbClr val="FFFFFF"/>
-                  </a:gs>
-                  <a:gs pos="100000">
-                    <a:srgbClr val="FFFFFF"/>
-                  </a:gs>
-                </a:gsLst>
-                <a:lin ang="5400000" scaled="0"/>
-              </a:gradFill>
-              <a:ea typeface="Segoe UI" pitchFamily="34" charset="0"/>
-              <a:cs typeface="Segoe UI" pitchFamily="34" charset="0"/>
-            </a:endParaRPr>
-          </a:p>
-        </p:txBody>
-      </p:sp>
-      <p:sp>
-        <p:nvSpPr>
-          <p:cNvPr id="2" name="Title 1"/>
-          <p:cNvSpPr>
-            <a:spLocks noGrp="1"/>
-          </p:cNvSpPr>
-          <p:nvPr>
-            <p:ph type="title"/>
-          </p:nvPr>
-        </p:nvSpPr>
-        <p:spPr/>
-        <p:txBody>
-          <a:bodyPr/>
-          <a:lstStyle/>
-          <a:p>
-            <a:r>
-              <a:rPr lang="en-US" dirty="0"/>
-              <a:t>SDKs and Frameworks</a:t>
-            </a:r>
-          </a:p>
-        </p:txBody>
-      </p:sp>
-      <p:pic>
-        <p:nvPicPr>
-          <p:cNvPr id="11" name="Picture 10"/>
-          <p:cNvPicPr>
-            <a:picLocks noChangeAspect="1"/>
-          </p:cNvPicPr>
-          <p:nvPr/>
-        </p:nvPicPr>
-        <p:blipFill rotWithShape="1">
-          <a:blip r:embed="rId2">
-            <a:extLst>
-              <a:ext uri="{28A0092B-C50C-407E-A947-70E740481C1C}">
-                <a14:useLocalDpi xmlns:a14="http://schemas.microsoft.com/office/drawing/2010/main" val="0"/>
-              </a:ext>
-            </a:extLst>
-          </a:blip>
-          <a:srcRect l="69104"/>
-          <a:stretch/>
-        </p:blipFill>
-        <p:spPr>
-          <a:xfrm>
-            <a:off x="7985542" y="1973262"/>
-            <a:ext cx="1238930" cy="1209675"/>
-          </a:xfrm>
-          <a:prstGeom prst="rect">
-            <a:avLst/>
-          </a:prstGeom>
-        </p:spPr>
-      </p:pic>
-      <p:pic>
-        <p:nvPicPr>
-          <p:cNvPr id="12" name="Picture 11"/>
-          <p:cNvPicPr>
-            <a:picLocks noChangeAspect="1" noChangeArrowheads="1"/>
-          </p:cNvPicPr>
-          <p:nvPr/>
-        </p:nvPicPr>
-        <p:blipFill>
-          <a:blip r:embed="rId3">
-            <a:extLst>
-              <a:ext uri="{28A0092B-C50C-407E-A947-70E740481C1C}">
-                <a14:useLocalDpi xmlns:a14="http://schemas.microsoft.com/office/drawing/2010/main" val="0"/>
-              </a:ext>
-            </a:extLst>
-          </a:blip>
-          <a:stretch>
-            <a:fillRect/>
-          </a:stretch>
-        </p:blipFill>
-        <p:spPr bwMode="auto">
-          <a:xfrm>
-            <a:off x="9529430" y="1973262"/>
-            <a:ext cx="1072896" cy="1207008"/>
-          </a:xfrm>
-          <a:prstGeom prst="rect">
-            <a:avLst/>
-          </a:prstGeom>
-          <a:noFill/>
-          <a:extLst>
-            <a:ext uri="{909E8E84-426E-40DD-AFC4-6F175D3DCCD1}">
-              <a14:hiddenFill xmlns:a14="http://schemas.microsoft.com/office/drawing/2010/main">
-                <a:solidFill>
-                  <a:srgbClr val="FFFFFF"/>
-                </a:solidFill>
-              </a14:hiddenFill>
-            </a:ext>
-          </a:extLst>
-        </p:spPr>
-      </p:pic>
-      <p:pic>
-        <p:nvPicPr>
-          <p:cNvPr id="13" name="Picture 12"/>
-          <p:cNvPicPr>
-            <a:picLocks noChangeAspect="1" noChangeArrowheads="1"/>
-          </p:cNvPicPr>
-          <p:nvPr/>
-        </p:nvPicPr>
-        <p:blipFill>
-          <a:blip r:embed="rId4">
-            <a:extLst>
-              <a:ext uri="{28A0092B-C50C-407E-A947-70E740481C1C}">
-                <a14:useLocalDpi xmlns:a14="http://schemas.microsoft.com/office/drawing/2010/main" val="0"/>
-              </a:ext>
-            </a:extLst>
-          </a:blip>
-          <a:stretch>
-            <a:fillRect/>
-          </a:stretch>
-        </p:blipFill>
-        <p:spPr bwMode="auto">
-          <a:xfrm>
-            <a:off x="10922407" y="1973262"/>
-            <a:ext cx="1207008" cy="1207008"/>
-          </a:xfrm>
-          <a:prstGeom prst="rect">
-            <a:avLst/>
-          </a:prstGeom>
-          <a:noFill/>
-          <a:extLst>
-            <a:ext uri="{909E8E84-426E-40DD-AFC4-6F175D3DCCD1}">
-              <a14:hiddenFill xmlns:a14="http://schemas.microsoft.com/office/drawing/2010/main">
-                <a:solidFill>
-                  <a:srgbClr val="FFFFFF"/>
-                </a:solidFill>
-              </a14:hiddenFill>
-            </a:ext>
-          </a:extLst>
-        </p:spPr>
-      </p:pic>
-      <p:pic>
-        <p:nvPicPr>
-          <p:cNvPr id="14" name="Picture 13"/>
-          <p:cNvPicPr>
-            <a:picLocks noChangeAspect="1"/>
-          </p:cNvPicPr>
-          <p:nvPr/>
-        </p:nvPicPr>
-        <p:blipFill rotWithShape="1">
-          <a:blip r:embed="rId2">
-            <a:extLst>
-              <a:ext uri="{28A0092B-C50C-407E-A947-70E740481C1C}">
-                <a14:useLocalDpi xmlns:a14="http://schemas.microsoft.com/office/drawing/2010/main" val="0"/>
-              </a:ext>
-            </a:extLst>
-          </a:blip>
-          <a:srcRect r="68646"/>
-          <a:stretch/>
-        </p:blipFill>
-        <p:spPr>
-          <a:xfrm>
-            <a:off x="5048347" y="1973262"/>
-            <a:ext cx="1257300" cy="1209675"/>
-          </a:xfrm>
-          <a:prstGeom prst="rect">
-            <a:avLst/>
-          </a:prstGeom>
-        </p:spPr>
-      </p:pic>
-      <p:pic>
-        <p:nvPicPr>
-          <p:cNvPr id="15" name="Picture 14"/>
-          <p:cNvPicPr>
-            <a:picLocks noChangeAspect="1"/>
-          </p:cNvPicPr>
-          <p:nvPr/>
-        </p:nvPicPr>
-        <p:blipFill rotWithShape="1">
-          <a:blip r:embed="rId2">
-            <a:extLst>
-              <a:ext uri="{28A0092B-C50C-407E-A947-70E740481C1C}">
-                <a14:useLocalDpi xmlns:a14="http://schemas.microsoft.com/office/drawing/2010/main" val="0"/>
-              </a:ext>
-            </a:extLst>
-          </a:blip>
-          <a:srcRect l="34204" r="34442"/>
-          <a:stretch/>
-        </p:blipFill>
-        <p:spPr>
-          <a:xfrm>
-            <a:off x="6516944" y="1973262"/>
-            <a:ext cx="1257301" cy="1209675"/>
-          </a:xfrm>
-          <a:prstGeom prst="rect">
-            <a:avLst/>
-          </a:prstGeom>
-        </p:spPr>
-      </p:pic>
-      <p:sp>
-        <p:nvSpPr>
-          <p:cNvPr id="3" name="TextBox 2"/>
-          <p:cNvSpPr txBox="1"/>
-          <p:nvPr/>
-        </p:nvSpPr>
-        <p:spPr>
-          <a:xfrm>
-            <a:off x="11609" y="3421062"/>
-            <a:ext cx="4937314" cy="849463"/>
-          </a:xfrm>
-          <a:prstGeom prst="rect">
-            <a:avLst/>
-          </a:prstGeom>
-          <a:noFill/>
-        </p:spPr>
-        <p:txBody>
-          <a:bodyPr wrap="none" lIns="182880" tIns="146304" rIns="182880" bIns="146304" rtlCol="0">
-            <a:spAutoFit/>
-          </a:bodyPr>
-          <a:lstStyle/>
-          <a:p>
-            <a:pPr>
-              <a:lnSpc>
-                <a:spcPct val="90000"/>
-              </a:lnSpc>
-              <a:spcAft>
-                <a:spcPts val="600"/>
-              </a:spcAft>
-            </a:pPr>
-            <a:r>
-              <a:rPr lang="en-US" sz="4000" dirty="0">
-                <a:gradFill>
-                  <a:gsLst>
-                    <a:gs pos="2917">
-                      <a:schemeClr val="tx1"/>
-                    </a:gs>
-                    <a:gs pos="30000">
-                      <a:schemeClr val="tx1"/>
-                    </a:gs>
-                  </a:gsLst>
-                  <a:lin ang="5400000" scaled="0"/>
-                </a:gradFill>
-              </a:rPr>
-              <a:t>ADAL Library/Plugin</a:t>
-            </a:r>
-          </a:p>
-        </p:txBody>
-      </p:sp>
-      <p:sp>
-        <p:nvSpPr>
-          <p:cNvPr id="17" name="TextBox 16"/>
-          <p:cNvSpPr txBox="1"/>
-          <p:nvPr/>
-        </p:nvSpPr>
-        <p:spPr>
-          <a:xfrm>
-            <a:off x="1040" y="4270525"/>
-            <a:ext cx="5112297" cy="849463"/>
-          </a:xfrm>
-          <a:prstGeom prst="rect">
-            <a:avLst/>
-          </a:prstGeom>
-          <a:noFill/>
-        </p:spPr>
-        <p:txBody>
-          <a:bodyPr wrap="none" lIns="182880" tIns="146304" rIns="182880" bIns="146304" rtlCol="0">
-            <a:spAutoFit/>
-          </a:bodyPr>
-          <a:lstStyle/>
-          <a:p>
-            <a:pPr>
-              <a:lnSpc>
-                <a:spcPct val="90000"/>
-              </a:lnSpc>
-              <a:spcAft>
-                <a:spcPts val="600"/>
-              </a:spcAft>
-            </a:pPr>
-            <a:r>
-              <a:rPr lang="en-US" sz="4000" dirty="0">
-                <a:gradFill>
-                  <a:gsLst>
-                    <a:gs pos="2917">
-                      <a:schemeClr val="tx1"/>
-                    </a:gs>
-                    <a:gs pos="30000">
-                      <a:schemeClr val="tx1"/>
-                    </a:gs>
-                  </a:gsLst>
-                  <a:lin ang="5400000" scaled="0"/>
-                </a:gradFill>
-              </a:rPr>
-              <a:t>Microsoft Graph SDK</a:t>
-            </a:r>
-          </a:p>
-        </p:txBody>
-      </p:sp>
-      <p:sp>
-        <p:nvSpPr>
-          <p:cNvPr id="5" name="Oval 4"/>
-          <p:cNvSpPr/>
-          <p:nvPr/>
-        </p:nvSpPr>
-        <p:spPr bwMode="auto">
-          <a:xfrm>
-            <a:off x="5362672" y="3531468"/>
-            <a:ext cx="628650" cy="628650"/>
-          </a:xfrm>
-          <a:prstGeom prst="ellipse">
-            <a:avLst/>
-          </a:prstGeom>
-          <a:solidFill>
-            <a:srgbClr val="0093D4"/>
-          </a:solidFill>
-          <a:ln w="57150">
-            <a:solidFill>
-              <a:srgbClr val="0093D4"/>
-            </a:solidFill>
-            <a:headEnd type="none" w="med" len="med"/>
-            <a:tailEnd type="none" w="med" len="med"/>
-          </a:ln>
-          <a:effectLst/>
-        </p:spPr>
-        <p:style>
-          <a:lnRef idx="1">
-            <a:schemeClr val="accent2"/>
-          </a:lnRef>
-          <a:fillRef idx="3">
-            <a:schemeClr val="accent2"/>
-          </a:fillRef>
-          <a:effectRef idx="2">
-            <a:schemeClr val="accent2"/>
-          </a:effectRef>
-          <a:fontRef idx="minor">
-            <a:schemeClr val="lt1"/>
-          </a:fontRef>
-        </p:style>
-        <p:txBody>
-          <a:bodyPr rot="0" spcFirstLastPara="0" vertOverflow="overflow" horzOverflow="overflow" vert="horz" wrap="square" lIns="182880" tIns="146304" rIns="182880" bIns="146304" numCol="1" spcCol="0" rtlCol="0" fromWordArt="0" anchor="t" anchorCtr="0" forceAA="0" compatLnSpc="1">
-            <a:prstTxWarp prst="textNoShape">
-              <a:avLst/>
-            </a:prstTxWarp>
-            <a:noAutofit/>
-          </a:bodyPr>
-          <a:lstStyle/>
-          <a:p>
-            <a:pPr algn="ctr" defTabSz="932472" fontAlgn="base">
-              <a:lnSpc>
-                <a:spcPct val="90000"/>
-              </a:lnSpc>
-              <a:spcBef>
-                <a:spcPct val="0"/>
-              </a:spcBef>
-              <a:spcAft>
-                <a:spcPct val="0"/>
-              </a:spcAft>
-            </a:pPr>
-            <a:endParaRPr lang="en-US" sz="2400" dirty="0" err="1">
-              <a:gradFill>
-                <a:gsLst>
-                  <a:gs pos="0">
-                    <a:srgbClr val="FFFFFF"/>
-                  </a:gs>
-                  <a:gs pos="100000">
-                    <a:srgbClr val="FFFFFF"/>
-                  </a:gs>
-                </a:gsLst>
-                <a:lin ang="5400000" scaled="0"/>
-              </a:gradFill>
-              <a:ea typeface="Segoe UI" pitchFamily="34" charset="0"/>
-              <a:cs typeface="Segoe UI" pitchFamily="34" charset="0"/>
-            </a:endParaRPr>
-          </a:p>
-        </p:txBody>
-      </p:sp>
-      <p:sp>
-        <p:nvSpPr>
-          <p:cNvPr id="20" name="Oval 19"/>
-          <p:cNvSpPr/>
-          <p:nvPr/>
-        </p:nvSpPr>
-        <p:spPr bwMode="auto">
-          <a:xfrm>
-            <a:off x="5362672" y="4380931"/>
-            <a:ext cx="628650" cy="628650"/>
-          </a:xfrm>
-          <a:prstGeom prst="ellipse">
-            <a:avLst/>
-          </a:prstGeom>
-          <a:solidFill>
-            <a:srgbClr val="0093D4"/>
-          </a:solidFill>
-          <a:ln w="57150">
-            <a:solidFill>
-              <a:srgbClr val="0093D4"/>
-            </a:solidFill>
-            <a:headEnd type="none" w="med" len="med"/>
-            <a:tailEnd type="none" w="med" len="med"/>
-          </a:ln>
-          <a:effectLst/>
-        </p:spPr>
-        <p:style>
-          <a:lnRef idx="1">
-            <a:schemeClr val="accent2"/>
-          </a:lnRef>
-          <a:fillRef idx="3">
-            <a:schemeClr val="accent2"/>
-          </a:fillRef>
-          <a:effectRef idx="2">
-            <a:schemeClr val="accent2"/>
-          </a:effectRef>
-          <a:fontRef idx="minor">
-            <a:schemeClr val="lt1"/>
-          </a:fontRef>
-        </p:style>
-        <p:txBody>
-          <a:bodyPr rot="0" spcFirstLastPara="0" vertOverflow="overflow" horzOverflow="overflow" vert="horz" wrap="square" lIns="182880" tIns="146304" rIns="182880" bIns="146304" numCol="1" spcCol="0" rtlCol="0" fromWordArt="0" anchor="t" anchorCtr="0" forceAA="0" compatLnSpc="1">
-            <a:prstTxWarp prst="textNoShape">
-              <a:avLst/>
-            </a:prstTxWarp>
-            <a:noAutofit/>
-          </a:bodyPr>
-          <a:lstStyle/>
-          <a:p>
-            <a:pPr algn="ctr" defTabSz="932472" fontAlgn="base">
-              <a:lnSpc>
-                <a:spcPct val="90000"/>
-              </a:lnSpc>
-              <a:spcBef>
-                <a:spcPct val="0"/>
-              </a:spcBef>
-              <a:spcAft>
-                <a:spcPct val="0"/>
-              </a:spcAft>
-            </a:pPr>
-            <a:endParaRPr lang="en-US" sz="2400" dirty="0" err="1">
-              <a:gradFill>
-                <a:gsLst>
-                  <a:gs pos="0">
-                    <a:srgbClr val="FFFFFF"/>
-                  </a:gs>
-                  <a:gs pos="100000">
-                    <a:srgbClr val="FFFFFF"/>
-                  </a:gs>
-                </a:gsLst>
-                <a:lin ang="5400000" scaled="0"/>
-              </a:gradFill>
-              <a:ea typeface="Segoe UI" pitchFamily="34" charset="0"/>
-              <a:cs typeface="Segoe UI" pitchFamily="34" charset="0"/>
-            </a:endParaRPr>
-          </a:p>
-        </p:txBody>
-      </p:sp>
-      <p:sp>
-        <p:nvSpPr>
-          <p:cNvPr id="21" name="Oval 20"/>
-          <p:cNvSpPr/>
-          <p:nvPr/>
-        </p:nvSpPr>
-        <p:spPr bwMode="auto">
-          <a:xfrm>
-            <a:off x="6831269" y="3531468"/>
-            <a:ext cx="628650" cy="628650"/>
-          </a:xfrm>
-          <a:prstGeom prst="ellipse">
-            <a:avLst/>
-          </a:prstGeom>
-          <a:solidFill>
-            <a:srgbClr val="CCCCCC"/>
-          </a:solidFill>
-          <a:ln w="57150">
-            <a:solidFill>
-              <a:srgbClr val="CCCCCC"/>
-            </a:solidFill>
-            <a:headEnd type="none" w="med" len="med"/>
-            <a:tailEnd type="none" w="med" len="med"/>
-          </a:ln>
-          <a:effectLst/>
-        </p:spPr>
-        <p:style>
-          <a:lnRef idx="1">
-            <a:schemeClr val="accent2"/>
-          </a:lnRef>
-          <a:fillRef idx="3">
-            <a:schemeClr val="accent2"/>
-          </a:fillRef>
-          <a:effectRef idx="2">
-            <a:schemeClr val="accent2"/>
-          </a:effectRef>
-          <a:fontRef idx="minor">
-            <a:schemeClr val="lt1"/>
-          </a:fontRef>
-        </p:style>
-        <p:txBody>
-          <a:bodyPr rot="0" spcFirstLastPara="0" vertOverflow="overflow" horzOverflow="overflow" vert="horz" wrap="square" lIns="182880" tIns="146304" rIns="182880" bIns="146304" numCol="1" spcCol="0" rtlCol="0" fromWordArt="0" anchor="t" anchorCtr="0" forceAA="0" compatLnSpc="1">
-            <a:prstTxWarp prst="textNoShape">
-              <a:avLst/>
-            </a:prstTxWarp>
-            <a:noAutofit/>
-          </a:bodyPr>
-          <a:lstStyle/>
-          <a:p>
-            <a:pPr algn="ctr" defTabSz="932472" fontAlgn="base">
-              <a:lnSpc>
-                <a:spcPct val="90000"/>
-              </a:lnSpc>
-              <a:spcBef>
-                <a:spcPct val="0"/>
-              </a:spcBef>
-              <a:spcAft>
-                <a:spcPct val="0"/>
-              </a:spcAft>
-            </a:pPr>
-            <a:endParaRPr lang="en-US" sz="2400" dirty="0" err="1">
-              <a:gradFill>
-                <a:gsLst>
-                  <a:gs pos="0">
-                    <a:srgbClr val="FFFFFF"/>
-                  </a:gs>
-                  <a:gs pos="100000">
-                    <a:srgbClr val="FFFFFF"/>
-                  </a:gs>
-                </a:gsLst>
-                <a:lin ang="5400000" scaled="0"/>
-              </a:gradFill>
-              <a:ea typeface="Segoe UI" pitchFamily="34" charset="0"/>
-              <a:cs typeface="Segoe UI" pitchFamily="34" charset="0"/>
-            </a:endParaRPr>
-          </a:p>
-        </p:txBody>
-      </p:sp>
-      <p:sp>
-        <p:nvSpPr>
-          <p:cNvPr id="22" name="Oval 21"/>
-          <p:cNvSpPr/>
-          <p:nvPr/>
-        </p:nvSpPr>
-        <p:spPr bwMode="auto">
-          <a:xfrm>
-            <a:off x="6831269" y="4380931"/>
-            <a:ext cx="628650" cy="628650"/>
-          </a:xfrm>
-          <a:prstGeom prst="ellipse">
-            <a:avLst/>
-          </a:prstGeom>
-          <a:solidFill>
-            <a:srgbClr val="CCCCCC"/>
-          </a:solidFill>
-          <a:ln w="57150">
-            <a:solidFill>
-              <a:srgbClr val="CCCCCC"/>
-            </a:solidFill>
-            <a:headEnd type="none" w="med" len="med"/>
-            <a:tailEnd type="none" w="med" len="med"/>
-          </a:ln>
-          <a:effectLst/>
-        </p:spPr>
-        <p:style>
-          <a:lnRef idx="1">
-            <a:schemeClr val="accent2"/>
-          </a:lnRef>
-          <a:fillRef idx="3">
-            <a:schemeClr val="accent2"/>
-          </a:fillRef>
-          <a:effectRef idx="2">
-            <a:schemeClr val="accent2"/>
-          </a:effectRef>
-          <a:fontRef idx="minor">
-            <a:schemeClr val="lt1"/>
-          </a:fontRef>
-        </p:style>
-        <p:txBody>
-          <a:bodyPr rot="0" spcFirstLastPara="0" vertOverflow="overflow" horzOverflow="overflow" vert="horz" wrap="square" lIns="182880" tIns="146304" rIns="182880" bIns="146304" numCol="1" spcCol="0" rtlCol="0" fromWordArt="0" anchor="t" anchorCtr="0" forceAA="0" compatLnSpc="1">
-            <a:prstTxWarp prst="textNoShape">
-              <a:avLst/>
-            </a:prstTxWarp>
-            <a:noAutofit/>
-          </a:bodyPr>
-          <a:lstStyle/>
-          <a:p>
-            <a:pPr algn="ctr" defTabSz="932472" fontAlgn="base">
-              <a:lnSpc>
-                <a:spcPct val="90000"/>
-              </a:lnSpc>
-              <a:spcBef>
-                <a:spcPct val="0"/>
-              </a:spcBef>
-              <a:spcAft>
-                <a:spcPct val="0"/>
-              </a:spcAft>
-            </a:pPr>
-            <a:endParaRPr lang="en-US" sz="2400" dirty="0" err="1">
-              <a:gradFill>
-                <a:gsLst>
-                  <a:gs pos="0">
-                    <a:srgbClr val="FFFFFF"/>
-                  </a:gs>
-                  <a:gs pos="100000">
-                    <a:srgbClr val="FFFFFF"/>
-                  </a:gs>
-                </a:gsLst>
-                <a:lin ang="5400000" scaled="0"/>
-              </a:gradFill>
-              <a:ea typeface="Segoe UI" pitchFamily="34" charset="0"/>
-              <a:cs typeface="Segoe UI" pitchFamily="34" charset="0"/>
-            </a:endParaRPr>
-          </a:p>
-        </p:txBody>
-      </p:sp>
-      <p:sp>
-        <p:nvSpPr>
-          <p:cNvPr id="24" name="Oval 23"/>
-          <p:cNvSpPr/>
-          <p:nvPr/>
-        </p:nvSpPr>
-        <p:spPr bwMode="auto">
-          <a:xfrm>
-            <a:off x="8290682" y="3531468"/>
-            <a:ext cx="628650" cy="628650"/>
-          </a:xfrm>
-          <a:prstGeom prst="ellipse">
-            <a:avLst/>
-          </a:prstGeom>
-          <a:solidFill>
-            <a:srgbClr val="94C83C"/>
-          </a:solidFill>
-          <a:ln w="57150">
-            <a:solidFill>
-              <a:srgbClr val="94C83C"/>
-            </a:solidFill>
-            <a:headEnd type="none" w="med" len="med"/>
-            <a:tailEnd type="none" w="med" len="med"/>
-          </a:ln>
-          <a:effectLst/>
-        </p:spPr>
-        <p:style>
-          <a:lnRef idx="1">
-            <a:schemeClr val="accent2"/>
-          </a:lnRef>
-          <a:fillRef idx="3">
-            <a:schemeClr val="accent2"/>
-          </a:fillRef>
-          <a:effectRef idx="2">
-            <a:schemeClr val="accent2"/>
-          </a:effectRef>
-          <a:fontRef idx="minor">
-            <a:schemeClr val="lt1"/>
-          </a:fontRef>
-        </p:style>
-        <p:txBody>
-          <a:bodyPr rot="0" spcFirstLastPara="0" vertOverflow="overflow" horzOverflow="overflow" vert="horz" wrap="square" lIns="182880" tIns="146304" rIns="182880" bIns="146304" numCol="1" spcCol="0" rtlCol="0" fromWordArt="0" anchor="t" anchorCtr="0" forceAA="0" compatLnSpc="1">
-            <a:prstTxWarp prst="textNoShape">
-              <a:avLst/>
-            </a:prstTxWarp>
-            <a:noAutofit/>
-          </a:bodyPr>
-          <a:lstStyle/>
-          <a:p>
-            <a:pPr algn="ctr" defTabSz="932472" fontAlgn="base">
-              <a:lnSpc>
-                <a:spcPct val="90000"/>
-              </a:lnSpc>
-              <a:spcBef>
-                <a:spcPct val="0"/>
-              </a:spcBef>
-              <a:spcAft>
-                <a:spcPct val="0"/>
-              </a:spcAft>
-            </a:pPr>
-            <a:endParaRPr lang="en-US" sz="2400" dirty="0" err="1">
-              <a:gradFill>
-                <a:gsLst>
-                  <a:gs pos="0">
-                    <a:srgbClr val="FFFFFF"/>
-                  </a:gs>
-                  <a:gs pos="100000">
-                    <a:srgbClr val="FFFFFF"/>
-                  </a:gs>
-                </a:gsLst>
-                <a:lin ang="5400000" scaled="0"/>
-              </a:gradFill>
-              <a:ea typeface="Segoe UI" pitchFamily="34" charset="0"/>
-              <a:cs typeface="Segoe UI" pitchFamily="34" charset="0"/>
-            </a:endParaRPr>
-          </a:p>
-        </p:txBody>
-      </p:sp>
-      <p:sp>
-        <p:nvSpPr>
-          <p:cNvPr id="27" name="Oval 26"/>
-          <p:cNvSpPr/>
-          <p:nvPr/>
-        </p:nvSpPr>
-        <p:spPr bwMode="auto">
-          <a:xfrm>
-            <a:off x="8288304" y="4380931"/>
-            <a:ext cx="628650" cy="628650"/>
-          </a:xfrm>
-          <a:prstGeom prst="ellipse">
-            <a:avLst/>
-          </a:prstGeom>
-          <a:solidFill>
-            <a:srgbClr val="94C83C"/>
-          </a:solidFill>
-          <a:ln w="57150">
-            <a:solidFill>
-              <a:srgbClr val="94C83C"/>
-            </a:solidFill>
-            <a:headEnd type="none" w="med" len="med"/>
-            <a:tailEnd type="none" w="med" len="med"/>
-          </a:ln>
-          <a:effectLst/>
-        </p:spPr>
-        <p:style>
-          <a:lnRef idx="1">
-            <a:schemeClr val="accent2"/>
-          </a:lnRef>
-          <a:fillRef idx="3">
-            <a:schemeClr val="accent2"/>
-          </a:fillRef>
-          <a:effectRef idx="2">
-            <a:schemeClr val="accent2"/>
-          </a:effectRef>
-          <a:fontRef idx="minor">
-            <a:schemeClr val="lt1"/>
-          </a:fontRef>
-        </p:style>
-        <p:txBody>
-          <a:bodyPr rot="0" spcFirstLastPara="0" vertOverflow="overflow" horzOverflow="overflow" vert="horz" wrap="square" lIns="182880" tIns="146304" rIns="182880" bIns="146304" numCol="1" spcCol="0" rtlCol="0" fromWordArt="0" anchor="t" anchorCtr="0" forceAA="0" compatLnSpc="1">
-            <a:prstTxWarp prst="textNoShape">
-              <a:avLst/>
-            </a:prstTxWarp>
-            <a:noAutofit/>
-          </a:bodyPr>
-          <a:lstStyle/>
-          <a:p>
-            <a:pPr algn="ctr" defTabSz="932472" fontAlgn="base">
-              <a:lnSpc>
-                <a:spcPct val="90000"/>
-              </a:lnSpc>
-              <a:spcBef>
-                <a:spcPct val="0"/>
-              </a:spcBef>
-              <a:spcAft>
-                <a:spcPct val="0"/>
-              </a:spcAft>
-            </a:pPr>
-            <a:endParaRPr lang="en-US" sz="2400" dirty="0" err="1">
-              <a:gradFill>
-                <a:gsLst>
-                  <a:gs pos="0">
-                    <a:srgbClr val="FFFFFF"/>
-                  </a:gs>
-                  <a:gs pos="100000">
-                    <a:srgbClr val="FFFFFF"/>
-                  </a:gs>
-                </a:gsLst>
-                <a:lin ang="5400000" scaled="0"/>
-              </a:gradFill>
-              <a:ea typeface="Segoe UI" pitchFamily="34" charset="0"/>
-              <a:cs typeface="Segoe UI" pitchFamily="34" charset="0"/>
-            </a:endParaRPr>
-          </a:p>
-        </p:txBody>
-      </p:sp>
-      <p:sp>
-        <p:nvSpPr>
-          <p:cNvPr id="28" name="Oval 27"/>
-          <p:cNvSpPr/>
-          <p:nvPr/>
-        </p:nvSpPr>
-        <p:spPr bwMode="auto">
-          <a:xfrm>
-            <a:off x="9751553" y="3529835"/>
-            <a:ext cx="628650" cy="628650"/>
-          </a:xfrm>
-          <a:prstGeom prst="ellipse">
-            <a:avLst/>
-          </a:prstGeom>
-          <a:solidFill>
-            <a:srgbClr val="364350"/>
-          </a:solidFill>
-          <a:ln w="57150">
-            <a:solidFill>
-              <a:srgbClr val="364350"/>
-            </a:solidFill>
-            <a:headEnd type="none" w="med" len="med"/>
-            <a:tailEnd type="none" w="med" len="med"/>
-          </a:ln>
-          <a:effectLst/>
-        </p:spPr>
-        <p:style>
-          <a:lnRef idx="1">
-            <a:schemeClr val="accent2"/>
-          </a:lnRef>
-          <a:fillRef idx="3">
-            <a:schemeClr val="accent2"/>
-          </a:fillRef>
-          <a:effectRef idx="2">
-            <a:schemeClr val="accent2"/>
-          </a:effectRef>
-          <a:fontRef idx="minor">
-            <a:schemeClr val="lt1"/>
-          </a:fontRef>
-        </p:style>
-        <p:txBody>
-          <a:bodyPr rot="0" spcFirstLastPara="0" vertOverflow="overflow" horzOverflow="overflow" vert="horz" wrap="square" lIns="182880" tIns="146304" rIns="182880" bIns="146304" numCol="1" spcCol="0" rtlCol="0" fromWordArt="0" anchor="t" anchorCtr="0" forceAA="0" compatLnSpc="1">
-            <a:prstTxWarp prst="textNoShape">
-              <a:avLst/>
-            </a:prstTxWarp>
-            <a:noAutofit/>
-          </a:bodyPr>
-          <a:lstStyle/>
-          <a:p>
-            <a:pPr algn="ctr" defTabSz="932472" fontAlgn="base">
-              <a:lnSpc>
-                <a:spcPct val="90000"/>
-              </a:lnSpc>
-              <a:spcBef>
-                <a:spcPct val="0"/>
-              </a:spcBef>
-              <a:spcAft>
-                <a:spcPct val="0"/>
-              </a:spcAft>
-            </a:pPr>
-            <a:endParaRPr lang="en-US" sz="2400" dirty="0" err="1">
-              <a:gradFill>
-                <a:gsLst>
-                  <a:gs pos="0">
-                    <a:srgbClr val="FFFFFF"/>
-                  </a:gs>
-                  <a:gs pos="100000">
-                    <a:srgbClr val="FFFFFF"/>
-                  </a:gs>
-                </a:gsLst>
-                <a:lin ang="5400000" scaled="0"/>
-              </a:gradFill>
-              <a:ea typeface="Segoe UI" pitchFamily="34" charset="0"/>
-              <a:cs typeface="Segoe UI" pitchFamily="34" charset="0"/>
-            </a:endParaRPr>
-          </a:p>
-        </p:txBody>
-      </p:sp>
-      <p:sp>
-        <p:nvSpPr>
-          <p:cNvPr id="29" name="Oval 28"/>
-          <p:cNvSpPr/>
-          <p:nvPr/>
-        </p:nvSpPr>
-        <p:spPr bwMode="auto">
-          <a:xfrm>
-            <a:off x="9751553" y="4380931"/>
-            <a:ext cx="628650" cy="628650"/>
-          </a:xfrm>
-          <a:prstGeom prst="ellipse">
-            <a:avLst/>
-          </a:prstGeom>
-          <a:noFill/>
-          <a:ln w="57150">
-            <a:solidFill>
-              <a:srgbClr val="364350"/>
-            </a:solidFill>
-            <a:headEnd type="none" w="med" len="med"/>
-            <a:tailEnd type="none" w="med" len="med"/>
-          </a:ln>
-          <a:effectLst/>
-        </p:spPr>
-        <p:style>
-          <a:lnRef idx="1">
-            <a:schemeClr val="accent2"/>
-          </a:lnRef>
-          <a:fillRef idx="3">
-            <a:schemeClr val="accent2"/>
-          </a:fillRef>
-          <a:effectRef idx="2">
-            <a:schemeClr val="accent2"/>
-          </a:effectRef>
-          <a:fontRef idx="minor">
-            <a:schemeClr val="lt1"/>
-          </a:fontRef>
-        </p:style>
-        <p:txBody>
-          <a:bodyPr rot="0" spcFirstLastPara="0" vertOverflow="overflow" horzOverflow="overflow" vert="horz" wrap="square" lIns="182880" tIns="146304" rIns="182880" bIns="146304" numCol="1" spcCol="0" rtlCol="0" fromWordArt="0" anchor="t" anchorCtr="0" forceAA="0" compatLnSpc="1">
-            <a:prstTxWarp prst="textNoShape">
-              <a:avLst/>
-            </a:prstTxWarp>
-            <a:noAutofit/>
-          </a:bodyPr>
-          <a:lstStyle/>
-          <a:p>
-            <a:pPr algn="ctr" defTabSz="932472" fontAlgn="base">
-              <a:lnSpc>
-                <a:spcPct val="90000"/>
-              </a:lnSpc>
-              <a:spcBef>
-                <a:spcPct val="0"/>
-              </a:spcBef>
-              <a:spcAft>
-                <a:spcPct val="0"/>
-              </a:spcAft>
-            </a:pPr>
-            <a:endParaRPr lang="en-US" sz="2400" dirty="0" err="1">
-              <a:gradFill>
-                <a:gsLst>
-                  <a:gs pos="0">
-                    <a:srgbClr val="FFFFFF"/>
-                  </a:gs>
-                  <a:gs pos="100000">
-                    <a:srgbClr val="FFFFFF"/>
-                  </a:gs>
-                </a:gsLst>
-                <a:lin ang="5400000" scaled="0"/>
-              </a:gradFill>
-              <a:ea typeface="Segoe UI" pitchFamily="34" charset="0"/>
-              <a:cs typeface="Segoe UI" pitchFamily="34" charset="0"/>
-            </a:endParaRPr>
-          </a:p>
-        </p:txBody>
-      </p:sp>
-      <p:sp>
-        <p:nvSpPr>
-          <p:cNvPr id="30" name="Oval 29"/>
-          <p:cNvSpPr/>
-          <p:nvPr/>
-        </p:nvSpPr>
-        <p:spPr bwMode="auto">
-          <a:xfrm>
-            <a:off x="11214802" y="3529835"/>
-            <a:ext cx="628650" cy="628650"/>
-          </a:xfrm>
-          <a:prstGeom prst="ellipse">
-            <a:avLst/>
-          </a:prstGeom>
-          <a:solidFill>
-            <a:srgbClr val="2287CA"/>
-          </a:solidFill>
-          <a:ln w="57150">
-            <a:solidFill>
-              <a:srgbClr val="2287CA"/>
-            </a:solidFill>
-            <a:headEnd type="none" w="med" len="med"/>
-            <a:tailEnd type="none" w="med" len="med"/>
-          </a:ln>
-          <a:effectLst/>
-        </p:spPr>
-        <p:style>
-          <a:lnRef idx="1">
-            <a:schemeClr val="accent2"/>
-          </a:lnRef>
-          <a:fillRef idx="3">
-            <a:schemeClr val="accent2"/>
-          </a:fillRef>
-          <a:effectRef idx="2">
-            <a:schemeClr val="accent2"/>
-          </a:effectRef>
-          <a:fontRef idx="minor">
-            <a:schemeClr val="lt1"/>
-          </a:fontRef>
-        </p:style>
-        <p:txBody>
-          <a:bodyPr rot="0" spcFirstLastPara="0" vertOverflow="overflow" horzOverflow="overflow" vert="horz" wrap="square" lIns="182880" tIns="146304" rIns="182880" bIns="146304" numCol="1" spcCol="0" rtlCol="0" fromWordArt="0" anchor="t" anchorCtr="0" forceAA="0" compatLnSpc="1">
-            <a:prstTxWarp prst="textNoShape">
-              <a:avLst/>
-            </a:prstTxWarp>
-            <a:noAutofit/>
-          </a:bodyPr>
-          <a:lstStyle/>
-          <a:p>
-            <a:pPr algn="ctr" defTabSz="932472" fontAlgn="base">
-              <a:lnSpc>
-                <a:spcPct val="90000"/>
-              </a:lnSpc>
-              <a:spcBef>
-                <a:spcPct val="0"/>
-              </a:spcBef>
-              <a:spcAft>
-                <a:spcPct val="0"/>
-              </a:spcAft>
-            </a:pPr>
-            <a:endParaRPr lang="en-US" sz="2400" dirty="0" err="1">
-              <a:gradFill>
-                <a:gsLst>
-                  <a:gs pos="0">
-                    <a:srgbClr val="FFFFFF"/>
-                  </a:gs>
-                  <a:gs pos="100000">
-                    <a:srgbClr val="FFFFFF"/>
-                  </a:gs>
-                </a:gsLst>
-                <a:lin ang="5400000" scaled="0"/>
-              </a:gradFill>
-              <a:ea typeface="Segoe UI" pitchFamily="34" charset="0"/>
-              <a:cs typeface="Segoe UI" pitchFamily="34" charset="0"/>
-            </a:endParaRPr>
-          </a:p>
-        </p:txBody>
-      </p:sp>
-      <p:sp>
-        <p:nvSpPr>
-          <p:cNvPr id="31" name="Oval 30"/>
-          <p:cNvSpPr/>
-          <p:nvPr/>
-        </p:nvSpPr>
-        <p:spPr bwMode="auto">
-          <a:xfrm>
-            <a:off x="11214802" y="4380931"/>
-            <a:ext cx="628650" cy="628650"/>
-          </a:xfrm>
-          <a:prstGeom prst="ellipse">
-            <a:avLst/>
-          </a:prstGeom>
-          <a:solidFill>
-            <a:srgbClr val="2287CA"/>
-          </a:solidFill>
-          <a:ln w="57150">
-            <a:solidFill>
-              <a:srgbClr val="2287CA"/>
-            </a:solidFill>
-            <a:headEnd type="none" w="med" len="med"/>
-            <a:tailEnd type="none" w="med" len="med"/>
-          </a:ln>
-          <a:effectLst/>
-        </p:spPr>
-        <p:style>
-          <a:lnRef idx="1">
-            <a:schemeClr val="accent2"/>
-          </a:lnRef>
-          <a:fillRef idx="3">
-            <a:schemeClr val="accent2"/>
-          </a:fillRef>
-          <a:effectRef idx="2">
-            <a:schemeClr val="accent2"/>
-          </a:effectRef>
-          <a:fontRef idx="minor">
-            <a:schemeClr val="lt1"/>
-          </a:fontRef>
-        </p:style>
-        <p:txBody>
-          <a:bodyPr rot="0" spcFirstLastPara="0" vertOverflow="overflow" horzOverflow="overflow" vert="horz" wrap="square" lIns="182880" tIns="146304" rIns="182880" bIns="146304" numCol="1" spcCol="0" rtlCol="0" fromWordArt="0" anchor="t" anchorCtr="0" forceAA="0" compatLnSpc="1">
-            <a:prstTxWarp prst="textNoShape">
-              <a:avLst/>
-            </a:prstTxWarp>
-            <a:noAutofit/>
-          </a:bodyPr>
-          <a:lstStyle/>
-          <a:p>
-            <a:pPr algn="ctr" defTabSz="932472" fontAlgn="base">
-              <a:lnSpc>
-                <a:spcPct val="90000"/>
-              </a:lnSpc>
-              <a:spcBef>
-                <a:spcPct val="0"/>
-              </a:spcBef>
-              <a:spcAft>
-                <a:spcPct val="0"/>
-              </a:spcAft>
-            </a:pPr>
-            <a:endParaRPr lang="en-US" sz="2400" dirty="0" err="1">
-              <a:gradFill>
-                <a:gsLst>
-                  <a:gs pos="0">
-                    <a:srgbClr val="FFFFFF"/>
-                  </a:gs>
-                  <a:gs pos="100000">
-                    <a:srgbClr val="FFFFFF"/>
-                  </a:gs>
-                </a:gsLst>
-                <a:lin ang="5400000" scaled="0"/>
-              </a:gradFill>
-              <a:ea typeface="Segoe UI" pitchFamily="34" charset="0"/>
-              <a:cs typeface="Segoe UI" pitchFamily="34" charset="0"/>
-            </a:endParaRPr>
-          </a:p>
-        </p:txBody>
-      </p:sp>
-      <p:sp>
-        <p:nvSpPr>
-          <p:cNvPr id="32" name="TextBox 31"/>
-          <p:cNvSpPr txBox="1"/>
-          <p:nvPr/>
-        </p:nvSpPr>
-        <p:spPr>
-          <a:xfrm>
-            <a:off x="18079" y="5119988"/>
-            <a:ext cx="3791744" cy="849463"/>
-          </a:xfrm>
-          <a:prstGeom prst="rect">
-            <a:avLst/>
-          </a:prstGeom>
-          <a:noFill/>
-        </p:spPr>
-        <p:txBody>
-          <a:bodyPr wrap="none" lIns="182880" tIns="146304" rIns="182880" bIns="146304" rtlCol="0">
-            <a:spAutoFit/>
-          </a:bodyPr>
-          <a:lstStyle/>
-          <a:p>
-            <a:pPr>
-              <a:lnSpc>
-                <a:spcPct val="90000"/>
-              </a:lnSpc>
-              <a:spcAft>
-                <a:spcPts val="600"/>
-              </a:spcAft>
-            </a:pPr>
-            <a:r>
-              <a:rPr lang="en-US" sz="4000" dirty="0">
-                <a:gradFill>
-                  <a:gsLst>
-                    <a:gs pos="2917">
-                      <a:schemeClr val="tx1"/>
-                    </a:gs>
-                    <a:gs pos="30000">
-                      <a:schemeClr val="tx1"/>
-                    </a:gs>
-                  </a:gsLst>
-                  <a:lin ang="5400000" scaled="0"/>
-                </a:gradFill>
-              </a:rPr>
-              <a:t>Office 365 APIs</a:t>
-            </a:r>
-          </a:p>
-        </p:txBody>
-      </p:sp>
-      <p:sp>
-        <p:nvSpPr>
-          <p:cNvPr id="33" name="Oval 32"/>
-          <p:cNvSpPr/>
-          <p:nvPr/>
-        </p:nvSpPr>
-        <p:spPr bwMode="auto">
-          <a:xfrm>
-            <a:off x="5362672" y="5226810"/>
-            <a:ext cx="628650" cy="628650"/>
-          </a:xfrm>
-          <a:prstGeom prst="ellipse">
-            <a:avLst/>
-          </a:prstGeom>
-          <a:solidFill>
-            <a:srgbClr val="0093D4"/>
-          </a:solidFill>
-          <a:ln w="57150">
-            <a:solidFill>
-              <a:srgbClr val="0093D4"/>
-            </a:solidFill>
-            <a:headEnd type="none" w="med" len="med"/>
-            <a:tailEnd type="none" w="med" len="med"/>
-          </a:ln>
-          <a:effectLst/>
-        </p:spPr>
-        <p:style>
-          <a:lnRef idx="1">
-            <a:schemeClr val="accent2"/>
-          </a:lnRef>
-          <a:fillRef idx="3">
-            <a:schemeClr val="accent2"/>
-          </a:fillRef>
-          <a:effectRef idx="2">
-            <a:schemeClr val="accent2"/>
-          </a:effectRef>
-          <a:fontRef idx="minor">
-            <a:schemeClr val="lt1"/>
-          </a:fontRef>
-        </p:style>
-        <p:txBody>
-          <a:bodyPr rot="0" spcFirstLastPara="0" vertOverflow="overflow" horzOverflow="overflow" vert="horz" wrap="square" lIns="182880" tIns="146304" rIns="182880" bIns="146304" numCol="1" spcCol="0" rtlCol="0" fromWordArt="0" anchor="t" anchorCtr="0" forceAA="0" compatLnSpc="1">
-            <a:prstTxWarp prst="textNoShape">
-              <a:avLst/>
-            </a:prstTxWarp>
-            <a:noAutofit/>
-          </a:bodyPr>
-          <a:lstStyle/>
-          <a:p>
-            <a:pPr algn="ctr" defTabSz="932472" fontAlgn="base">
-              <a:lnSpc>
-                <a:spcPct val="90000"/>
-              </a:lnSpc>
-              <a:spcBef>
-                <a:spcPct val="0"/>
-              </a:spcBef>
-              <a:spcAft>
-                <a:spcPct val="0"/>
-              </a:spcAft>
-            </a:pPr>
-            <a:endParaRPr lang="en-US" sz="2400" dirty="0" err="1">
-              <a:gradFill>
-                <a:gsLst>
-                  <a:gs pos="0">
-                    <a:srgbClr val="FFFFFF"/>
-                  </a:gs>
-                  <a:gs pos="100000">
-                    <a:srgbClr val="FFFFFF"/>
-                  </a:gs>
-                </a:gsLst>
-                <a:lin ang="5400000" scaled="0"/>
-              </a:gradFill>
-              <a:ea typeface="Segoe UI" pitchFamily="34" charset="0"/>
-              <a:cs typeface="Segoe UI" pitchFamily="34" charset="0"/>
-            </a:endParaRPr>
-          </a:p>
-        </p:txBody>
-      </p:sp>
-      <p:sp>
-        <p:nvSpPr>
-          <p:cNvPr id="34" name="Oval 33"/>
-          <p:cNvSpPr/>
-          <p:nvPr/>
-        </p:nvSpPr>
-        <p:spPr bwMode="auto">
-          <a:xfrm>
-            <a:off x="6831269" y="5226810"/>
-            <a:ext cx="628650" cy="628650"/>
-          </a:xfrm>
-          <a:prstGeom prst="ellipse">
-            <a:avLst/>
-          </a:prstGeom>
-          <a:solidFill>
-            <a:srgbClr val="CCCCCC"/>
-          </a:solidFill>
-          <a:ln w="57150">
-            <a:solidFill>
-              <a:srgbClr val="CCCCCC"/>
-            </a:solidFill>
-            <a:headEnd type="none" w="med" len="med"/>
-            <a:tailEnd type="none" w="med" len="med"/>
-          </a:ln>
-          <a:effectLst/>
-        </p:spPr>
-        <p:style>
-          <a:lnRef idx="1">
-            <a:schemeClr val="accent2"/>
-          </a:lnRef>
-          <a:fillRef idx="3">
-            <a:schemeClr val="accent2"/>
-          </a:fillRef>
-          <a:effectRef idx="2">
-            <a:schemeClr val="accent2"/>
-          </a:effectRef>
-          <a:fontRef idx="minor">
-            <a:schemeClr val="lt1"/>
-          </a:fontRef>
-        </p:style>
-        <p:txBody>
-          <a:bodyPr rot="0" spcFirstLastPara="0" vertOverflow="overflow" horzOverflow="overflow" vert="horz" wrap="square" lIns="182880" tIns="146304" rIns="182880" bIns="146304" numCol="1" spcCol="0" rtlCol="0" fromWordArt="0" anchor="t" anchorCtr="0" forceAA="0" compatLnSpc="1">
-            <a:prstTxWarp prst="textNoShape">
-              <a:avLst/>
-            </a:prstTxWarp>
-            <a:noAutofit/>
-          </a:bodyPr>
-          <a:lstStyle/>
-          <a:p>
-            <a:pPr algn="ctr" defTabSz="932472" fontAlgn="base">
-              <a:lnSpc>
-                <a:spcPct val="90000"/>
-              </a:lnSpc>
-              <a:spcBef>
-                <a:spcPct val="0"/>
-              </a:spcBef>
-              <a:spcAft>
-                <a:spcPct val="0"/>
-              </a:spcAft>
-            </a:pPr>
-            <a:endParaRPr lang="en-US" sz="2400" dirty="0" err="1">
-              <a:gradFill>
-                <a:gsLst>
-                  <a:gs pos="0">
-                    <a:srgbClr val="FFFFFF"/>
-                  </a:gs>
-                  <a:gs pos="100000">
-                    <a:srgbClr val="FFFFFF"/>
-                  </a:gs>
-                </a:gsLst>
-                <a:lin ang="5400000" scaled="0"/>
-              </a:gradFill>
-              <a:ea typeface="Segoe UI" pitchFamily="34" charset="0"/>
-              <a:cs typeface="Segoe UI" pitchFamily="34" charset="0"/>
-            </a:endParaRPr>
-          </a:p>
-        </p:txBody>
-      </p:sp>
-      <p:sp>
-        <p:nvSpPr>
-          <p:cNvPr id="35" name="Oval 34"/>
-          <p:cNvSpPr/>
-          <p:nvPr/>
-        </p:nvSpPr>
-        <p:spPr bwMode="auto">
-          <a:xfrm>
-            <a:off x="8288304" y="5226810"/>
-            <a:ext cx="628650" cy="628650"/>
-          </a:xfrm>
-          <a:prstGeom prst="ellipse">
-            <a:avLst/>
-          </a:prstGeom>
-          <a:solidFill>
-            <a:srgbClr val="94C83C"/>
-          </a:solidFill>
-          <a:ln w="57150">
-            <a:solidFill>
-              <a:srgbClr val="94C83C"/>
-            </a:solidFill>
-            <a:headEnd type="none" w="med" len="med"/>
-            <a:tailEnd type="none" w="med" len="med"/>
-          </a:ln>
-          <a:effectLst/>
-        </p:spPr>
-        <p:style>
-          <a:lnRef idx="1">
-            <a:schemeClr val="accent2"/>
-          </a:lnRef>
-          <a:fillRef idx="3">
-            <a:schemeClr val="accent2"/>
-          </a:fillRef>
-          <a:effectRef idx="2">
-            <a:schemeClr val="accent2"/>
-          </a:effectRef>
-          <a:fontRef idx="minor">
-            <a:schemeClr val="lt1"/>
-          </a:fontRef>
-        </p:style>
-        <p:txBody>
-          <a:bodyPr rot="0" spcFirstLastPara="0" vertOverflow="overflow" horzOverflow="overflow" vert="horz" wrap="square" lIns="182880" tIns="146304" rIns="182880" bIns="146304" numCol="1" spcCol="0" rtlCol="0" fromWordArt="0" anchor="t" anchorCtr="0" forceAA="0" compatLnSpc="1">
-            <a:prstTxWarp prst="textNoShape">
-              <a:avLst/>
-            </a:prstTxWarp>
-            <a:noAutofit/>
-          </a:bodyPr>
-          <a:lstStyle/>
-          <a:p>
-            <a:pPr algn="ctr" defTabSz="932472" fontAlgn="base">
-              <a:lnSpc>
-                <a:spcPct val="90000"/>
-              </a:lnSpc>
-              <a:spcBef>
-                <a:spcPct val="0"/>
-              </a:spcBef>
-              <a:spcAft>
-                <a:spcPct val="0"/>
-              </a:spcAft>
-            </a:pPr>
-            <a:endParaRPr lang="en-US" sz="2400" dirty="0" err="1">
-              <a:gradFill>
-                <a:gsLst>
-                  <a:gs pos="0">
-                    <a:srgbClr val="FFFFFF"/>
-                  </a:gs>
-                  <a:gs pos="100000">
-                    <a:srgbClr val="FFFFFF"/>
-                  </a:gs>
-                </a:gsLst>
-                <a:lin ang="5400000" scaled="0"/>
-              </a:gradFill>
-              <a:ea typeface="Segoe UI" pitchFamily="34" charset="0"/>
-              <a:cs typeface="Segoe UI" pitchFamily="34" charset="0"/>
-            </a:endParaRPr>
-          </a:p>
-        </p:txBody>
-      </p:sp>
-      <p:sp>
-        <p:nvSpPr>
-          <p:cNvPr id="36" name="Oval 35"/>
-          <p:cNvSpPr/>
-          <p:nvPr/>
-        </p:nvSpPr>
-        <p:spPr bwMode="auto">
-          <a:xfrm>
-            <a:off x="9751553" y="5226810"/>
-            <a:ext cx="628650" cy="628650"/>
-          </a:xfrm>
-          <a:prstGeom prst="ellipse">
-            <a:avLst/>
-          </a:prstGeom>
-          <a:solidFill>
-            <a:srgbClr val="364350"/>
-          </a:solidFill>
-          <a:ln w="57150">
-            <a:solidFill>
-              <a:srgbClr val="364350"/>
-            </a:solidFill>
-            <a:headEnd type="none" w="med" len="med"/>
-            <a:tailEnd type="none" w="med" len="med"/>
-          </a:ln>
-          <a:effectLst/>
-        </p:spPr>
-        <p:style>
-          <a:lnRef idx="1">
-            <a:schemeClr val="accent2"/>
-          </a:lnRef>
-          <a:fillRef idx="3">
-            <a:schemeClr val="accent2"/>
-          </a:fillRef>
-          <a:effectRef idx="2">
-            <a:schemeClr val="accent2"/>
-          </a:effectRef>
-          <a:fontRef idx="minor">
-            <a:schemeClr val="lt1"/>
-          </a:fontRef>
-        </p:style>
-        <p:txBody>
-          <a:bodyPr rot="0" spcFirstLastPara="0" vertOverflow="overflow" horzOverflow="overflow" vert="horz" wrap="square" lIns="182880" tIns="146304" rIns="182880" bIns="146304" numCol="1" spcCol="0" rtlCol="0" fromWordArt="0" anchor="t" anchorCtr="0" forceAA="0" compatLnSpc="1">
-            <a:prstTxWarp prst="textNoShape">
-              <a:avLst/>
-            </a:prstTxWarp>
-            <a:noAutofit/>
-          </a:bodyPr>
-          <a:lstStyle/>
-          <a:p>
-            <a:pPr algn="ctr" defTabSz="932472" fontAlgn="base">
-              <a:lnSpc>
-                <a:spcPct val="90000"/>
-              </a:lnSpc>
-              <a:spcBef>
-                <a:spcPct val="0"/>
-              </a:spcBef>
-              <a:spcAft>
-                <a:spcPct val="0"/>
-              </a:spcAft>
-            </a:pPr>
-            <a:endParaRPr lang="en-US" sz="2400" dirty="0" err="1">
-              <a:gradFill>
-                <a:gsLst>
-                  <a:gs pos="0">
-                    <a:srgbClr val="FFFFFF"/>
-                  </a:gs>
-                  <a:gs pos="100000">
-                    <a:srgbClr val="FFFFFF"/>
-                  </a:gs>
-                </a:gsLst>
-                <a:lin ang="5400000" scaled="0"/>
-              </a:gradFill>
-              <a:ea typeface="Segoe UI" pitchFamily="34" charset="0"/>
-              <a:cs typeface="Segoe UI" pitchFamily="34" charset="0"/>
-            </a:endParaRPr>
-          </a:p>
-        </p:txBody>
-      </p:sp>
-      <p:sp>
-        <p:nvSpPr>
-          <p:cNvPr id="37" name="Oval 36"/>
-          <p:cNvSpPr/>
-          <p:nvPr/>
-        </p:nvSpPr>
-        <p:spPr bwMode="auto">
-          <a:xfrm>
-            <a:off x="11214802" y="5226810"/>
-            <a:ext cx="628650" cy="628650"/>
-          </a:xfrm>
-          <a:prstGeom prst="ellipse">
-            <a:avLst/>
-          </a:prstGeom>
-          <a:solidFill>
-            <a:srgbClr val="2287CA"/>
-          </a:solidFill>
-          <a:ln w="57150">
-            <a:solidFill>
-              <a:srgbClr val="2287CA"/>
-            </a:solidFill>
-            <a:headEnd type="none" w="med" len="med"/>
-            <a:tailEnd type="none" w="med" len="med"/>
-          </a:ln>
-          <a:effectLst/>
-        </p:spPr>
-        <p:style>
-          <a:lnRef idx="1">
-            <a:schemeClr val="accent2"/>
-          </a:lnRef>
-          <a:fillRef idx="3">
-            <a:schemeClr val="accent2"/>
-          </a:fillRef>
-          <a:effectRef idx="2">
-            <a:schemeClr val="accent2"/>
-          </a:effectRef>
-          <a:fontRef idx="minor">
-            <a:schemeClr val="lt1"/>
-          </a:fontRef>
-        </p:style>
-        <p:txBody>
-          <a:bodyPr rot="0" spcFirstLastPara="0" vertOverflow="overflow" horzOverflow="overflow" vert="horz" wrap="square" lIns="182880" tIns="146304" rIns="182880" bIns="146304" numCol="1" spcCol="0" rtlCol="0" fromWordArt="0" anchor="t" anchorCtr="0" forceAA="0" compatLnSpc="1">
-            <a:prstTxWarp prst="textNoShape">
-              <a:avLst/>
-            </a:prstTxWarp>
-            <a:noAutofit/>
-          </a:bodyPr>
-          <a:lstStyle/>
-          <a:p>
-            <a:pPr algn="ctr" defTabSz="932472" fontAlgn="base">
-              <a:lnSpc>
-                <a:spcPct val="90000"/>
-              </a:lnSpc>
-              <a:spcBef>
-                <a:spcPct val="0"/>
-              </a:spcBef>
-              <a:spcAft>
-                <a:spcPct val="0"/>
-              </a:spcAft>
-            </a:pPr>
-            <a:endParaRPr lang="en-US" sz="2400" dirty="0" err="1">
-              <a:gradFill>
-                <a:gsLst>
-                  <a:gs pos="0">
-                    <a:srgbClr val="FFFFFF"/>
-                  </a:gs>
-                  <a:gs pos="100000">
-                    <a:srgbClr val="FFFFFF"/>
-                  </a:gs>
-                </a:gsLst>
-                <a:lin ang="5400000" scaled="0"/>
-              </a:gradFill>
-              <a:ea typeface="Segoe UI" pitchFamily="34" charset="0"/>
-              <a:cs typeface="Segoe UI" pitchFamily="34" charset="0"/>
-            </a:endParaRPr>
-          </a:p>
-        </p:txBody>
-      </p:sp>
-    </p:spTree>
-    <p:extLst>
-      <p:ext uri="{BB962C8B-B14F-4D97-AF65-F5344CB8AC3E}">
-        <p14:creationId xmlns:p14="http://schemas.microsoft.com/office/powerpoint/2010/main" val="3422493045"/>
-      </p:ext>
-    </p:extLst>
-  </p:cSld>
-  <p:clrMapOvr>
-    <a:masterClrMapping/>
-  </p:clrMapOvr>
-  <p:transition>
-    <p:fade/>
-  </p:transition>
-</p:sld>
-</file>
-
-<file path=ppt/slides/slide11.xml><?xml version="1.0" encoding="utf-8"?>
-<p:sld xmlns:a="http://schemas.openxmlformats.org/drawingml/2006/main" xmlns:r="http://schemas.openxmlformats.org/officeDocument/2006/relationships" xmlns:p="http://schemas.openxmlformats.org/presentationml/2006/main">
-  <p:cSld>
-    <p:spTree>
-      <p:nvGrpSpPr>
-        <p:cNvPr id="1" name=""/>
-        <p:cNvGrpSpPr/>
-        <p:nvPr/>
-      </p:nvGrpSpPr>
-      <p:grpSpPr>
-        <a:xfrm>
-          <a:off x="0" y="0"/>
-          <a:ext cx="0" cy="0"/>
-          <a:chOff x="0" y="0"/>
-          <a:chExt cx="0" cy="0"/>
-        </a:xfrm>
-      </p:grpSpPr>
-      <p:sp>
-        <p:nvSpPr>
           <p:cNvPr id="4" name="Title 3"/>
           <p:cNvSpPr>
             <a:spLocks noGrp="1"/>
@@ -33621,7 +31527,7 @@
 </p:sld>
 </file>
 
-<file path=ppt/slides/slide12.xml><?xml version="1.0" encoding="utf-8"?>
+<file path=ppt/slides/slide11.xml><?xml version="1.0" encoding="utf-8"?>
 <p:sld xmlns:a="http://schemas.openxmlformats.org/drawingml/2006/main" xmlns:r="http://schemas.openxmlformats.org/officeDocument/2006/relationships" xmlns:p="http://schemas.openxmlformats.org/presentationml/2006/main">
   <p:cSld>
     <p:spTree>
@@ -33804,6 +31710,182 @@
     <p:extLst>
       <p:ext uri="{BB962C8B-B14F-4D97-AF65-F5344CB8AC3E}">
         <p14:creationId xmlns:p14="http://schemas.microsoft.com/office/powerpoint/2010/main" val="3499816024"/>
+      </p:ext>
+    </p:extLst>
+  </p:cSld>
+  <p:clrMapOvr>
+    <a:masterClrMapping/>
+  </p:clrMapOvr>
+  <p:transition>
+    <p:fade/>
+  </p:transition>
+</p:sld>
+</file>
+
+<file path=ppt/slides/slide12.xml><?xml version="1.0" encoding="utf-8"?>
+<p:sld xmlns:a="http://schemas.openxmlformats.org/drawingml/2006/main" xmlns:r="http://schemas.openxmlformats.org/officeDocument/2006/relationships" xmlns:p="http://schemas.openxmlformats.org/presentationml/2006/main">
+  <p:cSld>
+    <p:spTree>
+      <p:nvGrpSpPr>
+        <p:cNvPr id="1" name=""/>
+        <p:cNvGrpSpPr/>
+        <p:nvPr/>
+      </p:nvGrpSpPr>
+      <p:grpSpPr>
+        <a:xfrm>
+          <a:off x="0" y="0"/>
+          <a:ext cx="0" cy="0"/>
+          <a:chOff x="0" y="0"/>
+          <a:chExt cx="0" cy="0"/>
+        </a:xfrm>
+      </p:grpSpPr>
+      <p:sp>
+        <p:nvSpPr>
+          <p:cNvPr id="2" name="Title 1"/>
+          <p:cNvSpPr>
+            <a:spLocks noGrp="1"/>
+          </p:cNvSpPr>
+          <p:nvPr>
+            <p:ph type="title"/>
+          </p:nvPr>
+        </p:nvSpPr>
+        <p:spPr/>
+        <p:txBody>
+          <a:bodyPr/>
+          <a:lstStyle/>
+          <a:p>
+            <a:r>
+              <a:rPr lang="en-US" dirty="0"/>
+              <a:t>View lab manual</a:t>
+            </a:r>
+          </a:p>
+        </p:txBody>
+      </p:sp>
+      <p:sp>
+        <p:nvSpPr>
+          <p:cNvPr id="3" name="Text Placeholder 2"/>
+          <p:cNvSpPr>
+            <a:spLocks noGrp="1"/>
+          </p:cNvSpPr>
+          <p:nvPr>
+            <p:ph type="body" sz="quarter" idx="10"/>
+          </p:nvPr>
+        </p:nvSpPr>
+        <p:spPr>
+          <a:xfrm>
+            <a:off x="274638" y="1212850"/>
+            <a:ext cx="6095999" cy="4235006"/>
+          </a:xfrm>
+        </p:spPr>
+        <p:txBody>
+          <a:bodyPr/>
+          <a:lstStyle/>
+          <a:p>
+            <a:pPr marL="514350" indent="-514350">
+              <a:buFont typeface="+mj-lt"/>
+              <a:buAutoNum type="arabicPeriod"/>
+            </a:pPr>
+            <a:r>
+              <a:rPr lang="en-US" sz="2800" dirty="0"/>
+              <a:t>On your desktop, click the </a:t>
+            </a:r>
+            <a:r>
+              <a:rPr lang="en-US" sz="2800" b="1" dirty="0"/>
+              <a:t>Office </a:t>
+            </a:r>
+            <a:r>
+              <a:rPr lang="en-US" sz="2800" b="1" dirty="0" err="1"/>
+              <a:t>CodeLabs</a:t>
+            </a:r>
+            <a:r>
+              <a:rPr lang="en-US" sz="2800" dirty="0"/>
+              <a:t> icon to open the browser at the </a:t>
+            </a:r>
+            <a:r>
+              <a:rPr lang="en-US" sz="2800" dirty="0" err="1"/>
+              <a:t>Github</a:t>
+            </a:r>
+            <a:r>
+              <a:rPr lang="en-US" sz="2800" dirty="0"/>
+              <a:t> repository for these labs: </a:t>
+            </a:r>
+            <a:br>
+              <a:rPr lang="en-US" sz="2800" dirty="0"/>
+            </a:br>
+            <a:r>
+              <a:rPr lang="en-US" sz="2800" b="1" dirty="0">
+                <a:hlinkClick r:id="rId2"/>
+              </a:rPr>
+              <a:t>https://github.com/Microsoft-Build-2016/CodeLabs-Office</a:t>
+            </a:r>
+            <a:endParaRPr lang="en-US" sz="2800" b="1" dirty="0"/>
+          </a:p>
+          <a:p>
+            <a:pPr marL="514350" indent="-514350">
+              <a:buFont typeface="+mj-lt"/>
+              <a:buAutoNum type="arabicPeriod"/>
+            </a:pPr>
+            <a:r>
+              <a:rPr lang="en-US" sz="2800" dirty="0"/>
+              <a:t>Click on the folder for the current module (</a:t>
+            </a:r>
+            <a:r>
+              <a:rPr lang="en-US" sz="2800" b="1" dirty="0"/>
+              <a:t>Module1-MsGraphMobile</a:t>
+            </a:r>
+            <a:r>
+              <a:rPr lang="en-US" sz="2800" dirty="0"/>
+              <a:t>)</a:t>
+            </a:r>
+          </a:p>
+          <a:p>
+            <a:pPr marL="514350" indent="-514350">
+              <a:buFont typeface="+mj-lt"/>
+              <a:buAutoNum type="arabicPeriod"/>
+            </a:pPr>
+            <a:r>
+              <a:rPr lang="en-US" sz="2800" dirty="0"/>
+              <a:t>Scroll down for the </a:t>
+            </a:r>
+            <a:r>
+              <a:rPr lang="en-US" sz="2800" b="1" dirty="0"/>
+              <a:t>README.md</a:t>
+            </a:r>
+            <a:r>
+              <a:rPr lang="en-US" sz="2800" dirty="0"/>
+              <a:t> – this is your lab manual</a:t>
+            </a:r>
+          </a:p>
+        </p:txBody>
+      </p:sp>
+      <p:pic>
+        <p:nvPicPr>
+          <p:cNvPr id="7" name="Picture 6"/>
+          <p:cNvPicPr>
+            <a:picLocks noChangeAspect="1"/>
+          </p:cNvPicPr>
+          <p:nvPr/>
+        </p:nvPicPr>
+        <p:blipFill>
+          <a:blip r:embed="rId3"/>
+          <a:stretch>
+            <a:fillRect/>
+          </a:stretch>
+        </p:blipFill>
+        <p:spPr>
+          <a:xfrm>
+            <a:off x="6289368" y="1212849"/>
+            <a:ext cx="5803704" cy="3783501"/>
+          </a:xfrm>
+          <a:prstGeom prst="rect">
+            <a:avLst/>
+          </a:prstGeom>
+        </p:spPr>
+      </p:pic>
+    </p:spTree>
+    <p:extLst>
+      <p:ext uri="{BB962C8B-B14F-4D97-AF65-F5344CB8AC3E}">
+        <p14:creationId xmlns:p14="http://schemas.microsoft.com/office/powerpoint/2010/main" val="1214596429"/>
       </p:ext>
     </p:extLst>
   </p:cSld>
@@ -34215,174 +32297,6 @@
       </p:grpSpPr>
       <p:sp>
         <p:nvSpPr>
-          <p:cNvPr id="2" name="Title 1"/>
-          <p:cNvSpPr>
-            <a:spLocks noGrp="1"/>
-          </p:cNvSpPr>
-          <p:nvPr>
-            <p:ph type="title"/>
-          </p:nvPr>
-        </p:nvSpPr>
-        <p:spPr/>
-        <p:txBody>
-          <a:bodyPr/>
-          <a:lstStyle/>
-          <a:p>
-            <a:r>
-              <a:rPr lang="en-US" dirty="0"/>
-              <a:t>View lab manual</a:t>
-            </a:r>
-          </a:p>
-        </p:txBody>
-      </p:sp>
-      <p:sp>
-        <p:nvSpPr>
-          <p:cNvPr id="3" name="Text Placeholder 2"/>
-          <p:cNvSpPr>
-            <a:spLocks noGrp="1"/>
-          </p:cNvSpPr>
-          <p:nvPr>
-            <p:ph type="body" sz="quarter" idx="10"/>
-          </p:nvPr>
-        </p:nvSpPr>
-        <p:spPr>
-          <a:xfrm>
-            <a:off x="274638" y="1212850"/>
-            <a:ext cx="5943599" cy="4235006"/>
-          </a:xfrm>
-        </p:spPr>
-        <p:txBody>
-          <a:bodyPr/>
-          <a:lstStyle/>
-          <a:p>
-            <a:pPr marL="514350" indent="-514350">
-              <a:buFont typeface="+mj-lt"/>
-              <a:buAutoNum type="arabicPeriod"/>
-            </a:pPr>
-            <a:r>
-              <a:rPr lang="en-US" sz="2800" dirty="0"/>
-              <a:t>On your desktop, click the </a:t>
-            </a:r>
-            <a:r>
-              <a:rPr lang="en-US" sz="2800" b="1" dirty="0"/>
-              <a:t>Office </a:t>
-            </a:r>
-            <a:r>
-              <a:rPr lang="en-US" sz="2800" b="1" dirty="0" err="1"/>
-              <a:t>CodeLabs</a:t>
-            </a:r>
-            <a:r>
-              <a:rPr lang="en-US" sz="2800" dirty="0"/>
-              <a:t> icon to open the browser at the </a:t>
-            </a:r>
-            <a:r>
-              <a:rPr lang="en-US" sz="2800" dirty="0" err="1"/>
-              <a:t>Github</a:t>
-            </a:r>
-            <a:r>
-              <a:rPr lang="en-US" sz="2800" dirty="0"/>
-              <a:t> repository for these labs: </a:t>
-            </a:r>
-            <a:br>
-              <a:rPr lang="en-US" sz="2800" dirty="0"/>
-            </a:br>
-            <a:r>
-              <a:rPr lang="en-US" sz="2800" b="1" dirty="0">
-                <a:hlinkClick r:id="rId2"/>
-              </a:rPr>
-              <a:t>https://github.com/Microsoft-Build-2016/CodeLabs-Office</a:t>
-            </a:r>
-            <a:endParaRPr lang="en-US" sz="2800" b="1" dirty="0"/>
-          </a:p>
-          <a:p>
-            <a:pPr marL="514350" indent="-514350">
-              <a:buFont typeface="+mj-lt"/>
-              <a:buAutoNum type="arabicPeriod"/>
-            </a:pPr>
-            <a:r>
-              <a:rPr lang="en-US" sz="2800" dirty="0"/>
-              <a:t>Click on the folder for the current module</a:t>
-            </a:r>
-          </a:p>
-          <a:p>
-            <a:pPr marL="514350" indent="-514350">
-              <a:buFont typeface="+mj-lt"/>
-              <a:buAutoNum type="arabicPeriod"/>
-            </a:pPr>
-            <a:r>
-              <a:rPr lang="en-US" sz="2800" dirty="0"/>
-              <a:t>Scroll down for the </a:t>
-            </a:r>
-            <a:r>
-              <a:rPr lang="en-US" sz="2800" b="1" dirty="0"/>
-              <a:t>README.md</a:t>
-            </a:r>
-            <a:r>
-              <a:rPr lang="en-US" sz="2800" dirty="0"/>
-              <a:t> – this is your lab manual</a:t>
-            </a:r>
-          </a:p>
-        </p:txBody>
-      </p:sp>
-      <p:pic>
-        <p:nvPicPr>
-          <p:cNvPr id="7" name="Picture 6"/>
-          <p:cNvPicPr>
-            <a:picLocks noChangeAspect="1"/>
-          </p:cNvPicPr>
-          <p:nvPr/>
-        </p:nvPicPr>
-        <p:blipFill>
-          <a:blip r:embed="rId3"/>
-          <a:stretch>
-            <a:fillRect/>
-          </a:stretch>
-        </p:blipFill>
-        <p:spPr>
-          <a:xfrm>
-            <a:off x="6289368" y="1212849"/>
-            <a:ext cx="5803704" cy="3783501"/>
-          </a:xfrm>
-          <a:prstGeom prst="rect">
-            <a:avLst/>
-          </a:prstGeom>
-        </p:spPr>
-      </p:pic>
-    </p:spTree>
-    <p:extLst>
-      <p:ext uri="{BB962C8B-B14F-4D97-AF65-F5344CB8AC3E}">
-        <p14:creationId xmlns:p14="http://schemas.microsoft.com/office/powerpoint/2010/main" val="1214596429"/>
-      </p:ext>
-    </p:extLst>
-  </p:cSld>
-  <p:clrMapOvr>
-    <a:masterClrMapping/>
-  </p:clrMapOvr>
-  <p:transition>
-    <p:fade/>
-  </p:transition>
-</p:sld>
-</file>
-
-<file path=ppt/slides/slide15.xml><?xml version="1.0" encoding="utf-8"?>
-<p:sld xmlns:a="http://schemas.openxmlformats.org/drawingml/2006/main" xmlns:r="http://schemas.openxmlformats.org/officeDocument/2006/relationships" xmlns:p="http://schemas.openxmlformats.org/presentationml/2006/main">
-  <p:cSld>
-    <p:spTree>
-      <p:nvGrpSpPr>
-        <p:cNvPr id="1" name=""/>
-        <p:cNvGrpSpPr/>
-        <p:nvPr/>
-      </p:nvGrpSpPr>
-      <p:grpSpPr>
-        <a:xfrm>
-          <a:off x="0" y="0"/>
-          <a:ext cx="0" cy="0"/>
-          <a:chOff x="0" y="0"/>
-          <a:chExt cx="0" cy="0"/>
-        </a:xfrm>
-      </p:grpSpPr>
-      <p:sp>
-        <p:nvSpPr>
           <p:cNvPr id="4" name="Title 3"/>
           <p:cNvSpPr>
             <a:spLocks noGrp="1"/>
@@ -34419,7 +32333,7 @@
 </p:sld>
 </file>
 
-<file path=ppt/slides/slide16.xml><?xml version="1.0" encoding="utf-8"?>
+<file path=ppt/slides/slide15.xml><?xml version="1.0" encoding="utf-8"?>
 <p:sld xmlns:a="http://schemas.openxmlformats.org/drawingml/2006/main" xmlns:r="http://schemas.openxmlformats.org/officeDocument/2006/relationships" xmlns:p="http://schemas.openxmlformats.org/presentationml/2006/main">
   <p:cSld>
     <p:spTree>
@@ -34926,7 +32840,7 @@
 </p:sld>
 </file>
 
-<file path=ppt/slides/slide17.xml><?xml version="1.0" encoding="utf-8"?>
+<file path=ppt/slides/slide16.xml><?xml version="1.0" encoding="utf-8"?>
 <p:sld xmlns:a="http://schemas.openxmlformats.org/drawingml/2006/main" xmlns:r="http://schemas.openxmlformats.org/officeDocument/2006/relationships" xmlns:p="http://schemas.openxmlformats.org/presentationml/2006/main">
   <p:cSld>
     <p:spTree>
@@ -35103,7 +33017,7 @@
 </p:sld>
 </file>
 
-<file path=ppt/slides/slide18.xml><?xml version="1.0" encoding="utf-8"?>
+<file path=ppt/slides/slide17.xml><?xml version="1.0" encoding="utf-8"?>
 <p:sld xmlns:a="http://schemas.openxmlformats.org/drawingml/2006/main" xmlns:r="http://schemas.openxmlformats.org/officeDocument/2006/relationships" xmlns:p="http://schemas.openxmlformats.org/presentationml/2006/main">
   <p:cSld>
     <p:spTree>
@@ -38276,29 +36190,46 @@
           </a:p>
           <a:p>
             <a:r>
+              <a:rPr lang="en-US" sz="3600" dirty="0"/>
+              <a:t>Azure AD Authentication Libraries (ADAL)</a:t>
+            </a:r>
+            <a:endParaRPr lang="en-US" dirty="0"/>
+          </a:p>
+          <a:p>
+            <a:pPr lvl="1"/>
+            <a:r>
               <a:rPr lang="en-US" dirty="0"/>
-              <a:t>“Native” Azure Apps</a:t>
+              <a:t>Open Source Libraries that simplifies the authentication</a:t>
             </a:r>
           </a:p>
           <a:p>
             <a:pPr lvl="1"/>
             <a:r>
               <a:rPr lang="en-US" dirty="0"/>
-              <a:t>Inherently multi-tenant</a:t>
+              <a:t>Handles token acquisition and caching</a:t>
             </a:r>
           </a:p>
           <a:p>
             <a:pPr lvl="1"/>
             <a:r>
               <a:rPr lang="en-US" dirty="0"/>
-              <a:t>No client/app secret (think about distribution)</a:t>
+              <a:t>One GitHub on your favorite package manager (</a:t>
             </a:r>
-          </a:p>
-          <a:p>
-            <a:pPr lvl="1"/>
+            <a:r>
+              <a:rPr lang="en-US" dirty="0" err="1"/>
+              <a:t>NuGet</a:t>
+            </a:r>
             <a:r>
               <a:rPr lang="en-US" dirty="0"/>
-              <a:t>No application-only permissions (can go through proxy service)</a:t>
+              <a:t>, NPM, bower, </a:t>
+            </a:r>
+            <a:r>
+              <a:rPr lang="en-US" dirty="0" err="1"/>
+              <a:t>etc</a:t>
+            </a:r>
+            <a:r>
+              <a:rPr lang="en-US" dirty="0"/>
+              <a:t>)</a:t>
             </a:r>
           </a:p>
           <a:p>
@@ -38347,230 +36278,6 @@
 </file>
 
 <file path=ppt/slides/slide8.xml><?xml version="1.0" encoding="utf-8"?>
-<p:sld xmlns:a="http://schemas.openxmlformats.org/drawingml/2006/main" xmlns:r="http://schemas.openxmlformats.org/officeDocument/2006/relationships" xmlns:p="http://schemas.openxmlformats.org/presentationml/2006/main">
-  <p:cSld>
-    <p:spTree>
-      <p:nvGrpSpPr>
-        <p:cNvPr id="1" name=""/>
-        <p:cNvGrpSpPr/>
-        <p:nvPr/>
-      </p:nvGrpSpPr>
-      <p:grpSpPr>
-        <a:xfrm>
-          <a:off x="0" y="0"/>
-          <a:ext cx="0" cy="0"/>
-          <a:chOff x="0" y="0"/>
-          <a:chExt cx="0" cy="0"/>
-        </a:xfrm>
-      </p:grpSpPr>
-      <p:sp>
-        <p:nvSpPr>
-          <p:cNvPr id="2" name="Title 1"/>
-          <p:cNvSpPr>
-            <a:spLocks noGrp="1"/>
-          </p:cNvSpPr>
-          <p:nvPr>
-            <p:ph type="title"/>
-          </p:nvPr>
-        </p:nvSpPr>
-        <p:spPr/>
-        <p:txBody>
-          <a:bodyPr/>
-          <a:lstStyle/>
-          <a:p>
-            <a:r>
-              <a:rPr lang="en-US" dirty="0"/>
-              <a:t>Azure AD Authentication Libraries</a:t>
-            </a:r>
-          </a:p>
-        </p:txBody>
-      </p:sp>
-      <p:sp>
-        <p:nvSpPr>
-          <p:cNvPr id="3" name="Text Placeholder 2"/>
-          <p:cNvSpPr>
-            <a:spLocks noGrp="1"/>
-          </p:cNvSpPr>
-          <p:nvPr>
-            <p:ph type="body" sz="quarter" idx="10"/>
-          </p:nvPr>
-        </p:nvSpPr>
-        <p:spPr>
-          <a:xfrm>
-            <a:off x="274638" y="1212850"/>
-            <a:ext cx="11887200" cy="4801314"/>
-          </a:xfrm>
-        </p:spPr>
-        <p:txBody>
-          <a:bodyPr/>
-          <a:lstStyle/>
-          <a:p>
-            <a:r>
-              <a:rPr lang="en-US" dirty="0"/>
-              <a:t>Makes authentication easy</a:t>
-            </a:r>
-          </a:p>
-          <a:p>
-            <a:pPr lvl="1"/>
-            <a:r>
-              <a:rPr lang="en-US" dirty="0"/>
-              <a:t>Simplifies the authentication flow (supports multiple flows)</a:t>
-            </a:r>
-          </a:p>
-          <a:p>
-            <a:pPr lvl="1"/>
-            <a:r>
-              <a:rPr lang="en-US" dirty="0"/>
-              <a:t>Handles token acquisition and caching</a:t>
-            </a:r>
-          </a:p>
-          <a:p>
-            <a:pPr lvl="1"/>
-            <a:r>
-              <a:rPr lang="en-US" dirty="0"/>
-              <a:t>Delivers the sign-in form/control for mobile applications</a:t>
-            </a:r>
-          </a:p>
-          <a:p>
-            <a:pPr lvl="1"/>
-            <a:endParaRPr lang="en-US" dirty="0"/>
-          </a:p>
-          <a:p>
-            <a:r>
-              <a:rPr lang="en-US" dirty="0"/>
-              <a:t>Available for most platforms</a:t>
-            </a:r>
-          </a:p>
-          <a:p>
-            <a:pPr lvl="1"/>
-            <a:r>
-              <a:rPr lang="en-US" dirty="0"/>
-              <a:t>Native Applications (UWP, Android, iOS, Cordova, </a:t>
-            </a:r>
-            <a:r>
-              <a:rPr lang="en-US" dirty="0" err="1"/>
-              <a:t>etc</a:t>
-            </a:r>
-            <a:r>
-              <a:rPr lang="en-US" dirty="0"/>
-              <a:t>)</a:t>
-            </a:r>
-          </a:p>
-          <a:p>
-            <a:pPr lvl="1"/>
-            <a:r>
-              <a:rPr lang="en-US" dirty="0"/>
-              <a:t>Web Applications (.NET, Node.js, JavaScript/Angular, Python, Ruby, </a:t>
-            </a:r>
-            <a:r>
-              <a:rPr lang="en-US" dirty="0" err="1"/>
-              <a:t>etc</a:t>
-            </a:r>
-            <a:r>
-              <a:rPr lang="en-US" dirty="0"/>
-              <a:t>)</a:t>
-            </a:r>
-          </a:p>
-          <a:p>
-            <a:pPr lvl="1"/>
-            <a:endParaRPr lang="en-US" dirty="0"/>
-          </a:p>
-          <a:p>
-            <a:pPr lvl="1"/>
-            <a:r>
-              <a:rPr lang="en-US" sz="4000" dirty="0">
-                <a:gradFill>
-                  <a:gsLst>
-                    <a:gs pos="1250">
-                      <a:schemeClr val="tx2"/>
-                    </a:gs>
-                    <a:gs pos="99000">
-                      <a:schemeClr val="tx2"/>
-                    </a:gs>
-                  </a:gsLst>
-                  <a:lin ang="5400000" scaled="0"/>
-                </a:gradFill>
-                <a:latin typeface="+mj-lt"/>
-              </a:rPr>
-              <a:t>Open Source</a:t>
-            </a:r>
-          </a:p>
-          <a:p>
-            <a:pPr lvl="1"/>
-            <a:r>
-              <a:rPr lang="en-US" dirty="0"/>
-              <a:t>https://github.com/AzureAD</a:t>
-            </a:r>
-          </a:p>
-        </p:txBody>
-      </p:sp>
-      <p:pic>
-        <p:nvPicPr>
-          <p:cNvPr id="5" name="Picture 4"/>
-          <p:cNvPicPr>
-            <a:picLocks noChangeAspect="1"/>
-          </p:cNvPicPr>
-          <p:nvPr/>
-        </p:nvPicPr>
-        <p:blipFill>
-          <a:blip r:embed="rId3"/>
-          <a:stretch>
-            <a:fillRect/>
-          </a:stretch>
-        </p:blipFill>
-        <p:spPr>
-          <a:xfrm>
-            <a:off x="8923337" y="754061"/>
-            <a:ext cx="3019425" cy="5972175"/>
-          </a:xfrm>
-          <a:prstGeom prst="rect">
-            <a:avLst/>
-          </a:prstGeom>
-        </p:spPr>
-      </p:pic>
-      <p:pic>
-        <p:nvPicPr>
-          <p:cNvPr id="6" name="Picture 11"/>
-          <p:cNvPicPr>
-            <a:picLocks noChangeAspect="1"/>
-          </p:cNvPicPr>
-          <p:nvPr/>
-        </p:nvPicPr>
-        <p:blipFill rotWithShape="1">
-          <a:blip r:embed="rId4"/>
-          <a:srcRect l="43111" t="5413" r="8180" b="21991"/>
-          <a:stretch/>
-        </p:blipFill>
-        <p:spPr>
-          <a:xfrm>
-            <a:off x="9118599" y="1782762"/>
-            <a:ext cx="2628900" cy="3550785"/>
-          </a:xfrm>
-          <a:prstGeom prst="rect">
-            <a:avLst/>
-          </a:prstGeom>
-          <a:ln w="3175">
-            <a:noFill/>
-          </a:ln>
-        </p:spPr>
-      </p:pic>
-    </p:spTree>
-    <p:extLst>
-      <p:ext uri="{BB962C8B-B14F-4D97-AF65-F5344CB8AC3E}">
-        <p14:creationId xmlns:p14="http://schemas.microsoft.com/office/powerpoint/2010/main" val="3998633482"/>
-      </p:ext>
-    </p:extLst>
-  </p:cSld>
-  <p:clrMapOvr>
-    <a:masterClrMapping/>
-  </p:clrMapOvr>
-  <p:transition>
-    <p:fade/>
-  </p:transition>
-</p:sld>
-</file>
-
-<file path=ppt/slides/slide9.xml><?xml version="1.0" encoding="utf-8"?>
 <p:sld xmlns:a="http://schemas.openxmlformats.org/drawingml/2006/main" xmlns:r="http://schemas.openxmlformats.org/officeDocument/2006/relationships" xmlns:p="http://schemas.openxmlformats.org/presentationml/2006/main">
   <p:cSld>
     <p:spTree>
@@ -52519,6 +50226,1933 @@
 </p:sld>
 </file>
 
+<file path=ppt/slides/slide9.xml><?xml version="1.0" encoding="utf-8"?>
+<p:sld xmlns:a="http://schemas.openxmlformats.org/drawingml/2006/main" xmlns:r="http://schemas.openxmlformats.org/officeDocument/2006/relationships" xmlns:p="http://schemas.openxmlformats.org/presentationml/2006/main">
+  <p:cSld>
+    <p:spTree>
+      <p:nvGrpSpPr>
+        <p:cNvPr id="1" name=""/>
+        <p:cNvGrpSpPr/>
+        <p:nvPr/>
+      </p:nvGrpSpPr>
+      <p:grpSpPr>
+        <a:xfrm>
+          <a:off x="0" y="0"/>
+          <a:ext cx="0" cy="0"/>
+          <a:chOff x="0" y="0"/>
+          <a:chExt cx="0" cy="0"/>
+        </a:xfrm>
+      </p:grpSpPr>
+      <p:sp>
+        <p:nvSpPr>
+          <p:cNvPr id="38" name="Rectangle 37"/>
+          <p:cNvSpPr/>
+          <p:nvPr/>
+        </p:nvSpPr>
+        <p:spPr bwMode="auto">
+          <a:xfrm>
+            <a:off x="6423705" y="1820862"/>
+            <a:ext cx="1432120" cy="4381500"/>
+          </a:xfrm>
+          <a:prstGeom prst="rect">
+            <a:avLst/>
+          </a:prstGeom>
+          <a:solidFill>
+            <a:srgbClr val="CCCCCC">
+              <a:alpha val="20000"/>
+            </a:srgbClr>
+          </a:solidFill>
+          <a:ln>
+            <a:noFill/>
+            <a:headEnd type="none" w="med" len="med"/>
+            <a:tailEnd type="none" w="med" len="med"/>
+          </a:ln>
+          <a:effectLst/>
+        </p:spPr>
+        <p:style>
+          <a:lnRef idx="1">
+            <a:schemeClr val="accent2"/>
+          </a:lnRef>
+          <a:fillRef idx="3">
+            <a:schemeClr val="accent2"/>
+          </a:fillRef>
+          <a:effectRef idx="2">
+            <a:schemeClr val="accent2"/>
+          </a:effectRef>
+          <a:fontRef idx="minor">
+            <a:schemeClr val="lt1"/>
+          </a:fontRef>
+        </p:style>
+        <p:txBody>
+          <a:bodyPr rot="0" spcFirstLastPara="0" vertOverflow="overflow" horzOverflow="overflow" vert="horz" wrap="square" lIns="182880" tIns="146304" rIns="182880" bIns="146304" numCol="1" spcCol="0" rtlCol="0" fromWordArt="0" anchor="t" anchorCtr="0" forceAA="0" compatLnSpc="1">
+            <a:prstTxWarp prst="textNoShape">
+              <a:avLst/>
+            </a:prstTxWarp>
+            <a:noAutofit/>
+          </a:bodyPr>
+          <a:lstStyle/>
+          <a:p>
+            <a:pPr algn="ctr" defTabSz="932472" fontAlgn="base">
+              <a:lnSpc>
+                <a:spcPct val="90000"/>
+              </a:lnSpc>
+              <a:spcBef>
+                <a:spcPct val="0"/>
+              </a:spcBef>
+              <a:spcAft>
+                <a:spcPct val="0"/>
+              </a:spcAft>
+            </a:pPr>
+            <a:endParaRPr lang="en-US" sz="2400" dirty="0" err="1">
+              <a:gradFill>
+                <a:gsLst>
+                  <a:gs pos="0">
+                    <a:srgbClr val="FFFFFF"/>
+                  </a:gs>
+                  <a:gs pos="100000">
+                    <a:srgbClr val="FFFFFF"/>
+                  </a:gs>
+                </a:gsLst>
+                <a:lin ang="5400000" scaled="0"/>
+              </a:gradFill>
+              <a:ea typeface="Segoe UI" pitchFamily="34" charset="0"/>
+              <a:cs typeface="Segoe UI" pitchFamily="34" charset="0"/>
+            </a:endParaRPr>
+          </a:p>
+        </p:txBody>
+      </p:sp>
+      <p:sp>
+        <p:nvSpPr>
+          <p:cNvPr id="39" name="Rectangle 38"/>
+          <p:cNvSpPr/>
+          <p:nvPr/>
+        </p:nvSpPr>
+        <p:spPr bwMode="auto">
+          <a:xfrm>
+            <a:off x="7886569" y="1820862"/>
+            <a:ext cx="1432120" cy="4381500"/>
+          </a:xfrm>
+          <a:prstGeom prst="rect">
+            <a:avLst/>
+          </a:prstGeom>
+          <a:solidFill>
+            <a:srgbClr val="92D050">
+              <a:alpha val="20000"/>
+            </a:srgbClr>
+          </a:solidFill>
+          <a:ln>
+            <a:noFill/>
+            <a:headEnd type="none" w="med" len="med"/>
+            <a:tailEnd type="none" w="med" len="med"/>
+          </a:ln>
+          <a:effectLst/>
+        </p:spPr>
+        <p:style>
+          <a:lnRef idx="1">
+            <a:schemeClr val="accent2"/>
+          </a:lnRef>
+          <a:fillRef idx="3">
+            <a:schemeClr val="accent2"/>
+          </a:fillRef>
+          <a:effectRef idx="2">
+            <a:schemeClr val="accent2"/>
+          </a:effectRef>
+          <a:fontRef idx="minor">
+            <a:schemeClr val="lt1"/>
+          </a:fontRef>
+        </p:style>
+        <p:txBody>
+          <a:bodyPr rot="0" spcFirstLastPara="0" vertOverflow="overflow" horzOverflow="overflow" vert="horz" wrap="square" lIns="182880" tIns="146304" rIns="182880" bIns="146304" numCol="1" spcCol="0" rtlCol="0" fromWordArt="0" anchor="t" anchorCtr="0" forceAA="0" compatLnSpc="1">
+            <a:prstTxWarp prst="textNoShape">
+              <a:avLst/>
+            </a:prstTxWarp>
+            <a:noAutofit/>
+          </a:bodyPr>
+          <a:lstStyle/>
+          <a:p>
+            <a:pPr algn="ctr" defTabSz="932472" fontAlgn="base">
+              <a:lnSpc>
+                <a:spcPct val="90000"/>
+              </a:lnSpc>
+              <a:spcBef>
+                <a:spcPct val="0"/>
+              </a:spcBef>
+              <a:spcAft>
+                <a:spcPct val="0"/>
+              </a:spcAft>
+            </a:pPr>
+            <a:endParaRPr lang="en-US" sz="2400" dirty="0" err="1">
+              <a:gradFill>
+                <a:gsLst>
+                  <a:gs pos="0">
+                    <a:srgbClr val="FFFFFF"/>
+                  </a:gs>
+                  <a:gs pos="100000">
+                    <a:srgbClr val="FFFFFF"/>
+                  </a:gs>
+                </a:gsLst>
+                <a:lin ang="5400000" scaled="0"/>
+              </a:gradFill>
+              <a:ea typeface="Segoe UI" pitchFamily="34" charset="0"/>
+              <a:cs typeface="Segoe UI" pitchFamily="34" charset="0"/>
+            </a:endParaRPr>
+          </a:p>
+        </p:txBody>
+      </p:sp>
+      <p:sp>
+        <p:nvSpPr>
+          <p:cNvPr id="40" name="Rectangle 39"/>
+          <p:cNvSpPr/>
+          <p:nvPr/>
+        </p:nvSpPr>
+        <p:spPr bwMode="auto">
+          <a:xfrm>
+            <a:off x="9349818" y="1820862"/>
+            <a:ext cx="1432120" cy="4381500"/>
+          </a:xfrm>
+          <a:prstGeom prst="rect">
+            <a:avLst/>
+          </a:prstGeom>
+          <a:solidFill>
+            <a:srgbClr val="364350">
+              <a:alpha val="20000"/>
+            </a:srgbClr>
+          </a:solidFill>
+          <a:ln>
+            <a:noFill/>
+            <a:headEnd type="none" w="med" len="med"/>
+            <a:tailEnd type="none" w="med" len="med"/>
+          </a:ln>
+          <a:effectLst/>
+        </p:spPr>
+        <p:style>
+          <a:lnRef idx="1">
+            <a:schemeClr val="accent2"/>
+          </a:lnRef>
+          <a:fillRef idx="3">
+            <a:schemeClr val="accent2"/>
+          </a:fillRef>
+          <a:effectRef idx="2">
+            <a:schemeClr val="accent2"/>
+          </a:effectRef>
+          <a:fontRef idx="minor">
+            <a:schemeClr val="lt1"/>
+          </a:fontRef>
+        </p:style>
+        <p:txBody>
+          <a:bodyPr rot="0" spcFirstLastPara="0" vertOverflow="overflow" horzOverflow="overflow" vert="horz" wrap="square" lIns="182880" tIns="146304" rIns="182880" bIns="146304" numCol="1" spcCol="0" rtlCol="0" fromWordArt="0" anchor="t" anchorCtr="0" forceAA="0" compatLnSpc="1">
+            <a:prstTxWarp prst="textNoShape">
+              <a:avLst/>
+            </a:prstTxWarp>
+            <a:noAutofit/>
+          </a:bodyPr>
+          <a:lstStyle/>
+          <a:p>
+            <a:pPr algn="ctr" defTabSz="932472" fontAlgn="base">
+              <a:lnSpc>
+                <a:spcPct val="90000"/>
+              </a:lnSpc>
+              <a:spcBef>
+                <a:spcPct val="0"/>
+              </a:spcBef>
+              <a:spcAft>
+                <a:spcPct val="0"/>
+              </a:spcAft>
+            </a:pPr>
+            <a:endParaRPr lang="en-US" sz="2400" dirty="0" err="1">
+              <a:gradFill>
+                <a:gsLst>
+                  <a:gs pos="0">
+                    <a:srgbClr val="FFFFFF"/>
+                  </a:gs>
+                  <a:gs pos="100000">
+                    <a:srgbClr val="FFFFFF"/>
+                  </a:gs>
+                </a:gsLst>
+                <a:lin ang="5400000" scaled="0"/>
+              </a:gradFill>
+              <a:ea typeface="Segoe UI" pitchFamily="34" charset="0"/>
+              <a:cs typeface="Segoe UI" pitchFamily="34" charset="0"/>
+            </a:endParaRPr>
+          </a:p>
+        </p:txBody>
+      </p:sp>
+      <p:sp>
+        <p:nvSpPr>
+          <p:cNvPr id="41" name="Rectangle 40"/>
+          <p:cNvSpPr/>
+          <p:nvPr/>
+        </p:nvSpPr>
+        <p:spPr bwMode="auto">
+          <a:xfrm>
+            <a:off x="10813067" y="1820862"/>
+            <a:ext cx="1432120" cy="4381500"/>
+          </a:xfrm>
+          <a:prstGeom prst="rect">
+            <a:avLst/>
+          </a:prstGeom>
+          <a:solidFill>
+            <a:srgbClr val="2287CA">
+              <a:alpha val="20000"/>
+            </a:srgbClr>
+          </a:solidFill>
+          <a:ln>
+            <a:noFill/>
+            <a:headEnd type="none" w="med" len="med"/>
+            <a:tailEnd type="none" w="med" len="med"/>
+          </a:ln>
+          <a:effectLst/>
+        </p:spPr>
+        <p:style>
+          <a:lnRef idx="1">
+            <a:schemeClr val="accent2"/>
+          </a:lnRef>
+          <a:fillRef idx="3">
+            <a:schemeClr val="accent2"/>
+          </a:fillRef>
+          <a:effectRef idx="2">
+            <a:schemeClr val="accent2"/>
+          </a:effectRef>
+          <a:fontRef idx="minor">
+            <a:schemeClr val="lt1"/>
+          </a:fontRef>
+        </p:style>
+        <p:txBody>
+          <a:bodyPr rot="0" spcFirstLastPara="0" vertOverflow="overflow" horzOverflow="overflow" vert="horz" wrap="square" lIns="182880" tIns="146304" rIns="182880" bIns="146304" numCol="1" spcCol="0" rtlCol="0" fromWordArt="0" anchor="t" anchorCtr="0" forceAA="0" compatLnSpc="1">
+            <a:prstTxWarp prst="textNoShape">
+              <a:avLst/>
+            </a:prstTxWarp>
+            <a:noAutofit/>
+          </a:bodyPr>
+          <a:lstStyle/>
+          <a:p>
+            <a:pPr algn="ctr" defTabSz="932472" fontAlgn="base">
+              <a:lnSpc>
+                <a:spcPct val="90000"/>
+              </a:lnSpc>
+              <a:spcBef>
+                <a:spcPct val="0"/>
+              </a:spcBef>
+              <a:spcAft>
+                <a:spcPct val="0"/>
+              </a:spcAft>
+            </a:pPr>
+            <a:endParaRPr lang="en-US" sz="2400" dirty="0" err="1">
+              <a:gradFill>
+                <a:gsLst>
+                  <a:gs pos="0">
+                    <a:srgbClr val="FFFFFF"/>
+                  </a:gs>
+                  <a:gs pos="100000">
+                    <a:srgbClr val="FFFFFF"/>
+                  </a:gs>
+                </a:gsLst>
+                <a:lin ang="5400000" scaled="0"/>
+              </a:gradFill>
+              <a:ea typeface="Segoe UI" pitchFamily="34" charset="0"/>
+              <a:cs typeface="Segoe UI" pitchFamily="34" charset="0"/>
+            </a:endParaRPr>
+          </a:p>
+        </p:txBody>
+      </p:sp>
+      <p:sp>
+        <p:nvSpPr>
+          <p:cNvPr id="6" name="Rectangle 5"/>
+          <p:cNvSpPr/>
+          <p:nvPr/>
+        </p:nvSpPr>
+        <p:spPr bwMode="auto">
+          <a:xfrm>
+            <a:off x="4960937" y="1820862"/>
+            <a:ext cx="1432120" cy="4381500"/>
+          </a:xfrm>
+          <a:prstGeom prst="rect">
+            <a:avLst/>
+          </a:prstGeom>
+          <a:solidFill>
+            <a:srgbClr val="0093D4">
+              <a:alpha val="20000"/>
+            </a:srgbClr>
+          </a:solidFill>
+          <a:ln>
+            <a:noFill/>
+            <a:headEnd type="none" w="med" len="med"/>
+            <a:tailEnd type="none" w="med" len="med"/>
+          </a:ln>
+          <a:effectLst/>
+        </p:spPr>
+        <p:style>
+          <a:lnRef idx="1">
+            <a:schemeClr val="accent2"/>
+          </a:lnRef>
+          <a:fillRef idx="3">
+            <a:schemeClr val="accent2"/>
+          </a:fillRef>
+          <a:effectRef idx="2">
+            <a:schemeClr val="accent2"/>
+          </a:effectRef>
+          <a:fontRef idx="minor">
+            <a:schemeClr val="lt1"/>
+          </a:fontRef>
+        </p:style>
+        <p:txBody>
+          <a:bodyPr rot="0" spcFirstLastPara="0" vertOverflow="overflow" horzOverflow="overflow" vert="horz" wrap="square" lIns="182880" tIns="146304" rIns="182880" bIns="146304" numCol="1" spcCol="0" rtlCol="0" fromWordArt="0" anchor="t" anchorCtr="0" forceAA="0" compatLnSpc="1">
+            <a:prstTxWarp prst="textNoShape">
+              <a:avLst/>
+            </a:prstTxWarp>
+            <a:noAutofit/>
+          </a:bodyPr>
+          <a:lstStyle/>
+          <a:p>
+            <a:pPr algn="ctr" defTabSz="932472" fontAlgn="base">
+              <a:lnSpc>
+                <a:spcPct val="90000"/>
+              </a:lnSpc>
+              <a:spcBef>
+                <a:spcPct val="0"/>
+              </a:spcBef>
+              <a:spcAft>
+                <a:spcPct val="0"/>
+              </a:spcAft>
+            </a:pPr>
+            <a:endParaRPr lang="en-US" sz="2400" dirty="0" err="1">
+              <a:gradFill>
+                <a:gsLst>
+                  <a:gs pos="0">
+                    <a:srgbClr val="FFFFFF"/>
+                  </a:gs>
+                  <a:gs pos="100000">
+                    <a:srgbClr val="FFFFFF"/>
+                  </a:gs>
+                </a:gsLst>
+                <a:lin ang="5400000" scaled="0"/>
+              </a:gradFill>
+              <a:ea typeface="Segoe UI" pitchFamily="34" charset="0"/>
+              <a:cs typeface="Segoe UI" pitchFamily="34" charset="0"/>
+            </a:endParaRPr>
+          </a:p>
+        </p:txBody>
+      </p:sp>
+      <p:sp>
+        <p:nvSpPr>
+          <p:cNvPr id="2" name="Title 1"/>
+          <p:cNvSpPr>
+            <a:spLocks noGrp="1"/>
+          </p:cNvSpPr>
+          <p:nvPr>
+            <p:ph type="title"/>
+          </p:nvPr>
+        </p:nvSpPr>
+        <p:spPr/>
+        <p:txBody>
+          <a:bodyPr/>
+          <a:lstStyle/>
+          <a:p>
+            <a:r>
+              <a:rPr lang="en-US" dirty="0"/>
+              <a:t>SDKs and Frameworks</a:t>
+            </a:r>
+          </a:p>
+        </p:txBody>
+      </p:sp>
+      <p:pic>
+        <p:nvPicPr>
+          <p:cNvPr id="11" name="Picture 10"/>
+          <p:cNvPicPr>
+            <a:picLocks noChangeAspect="1"/>
+          </p:cNvPicPr>
+          <p:nvPr/>
+        </p:nvPicPr>
+        <p:blipFill rotWithShape="1">
+          <a:blip r:embed="rId2">
+            <a:extLst>
+              <a:ext uri="{28A0092B-C50C-407E-A947-70E740481C1C}">
+                <a14:useLocalDpi xmlns:a14="http://schemas.microsoft.com/office/drawing/2010/main" val="0"/>
+              </a:ext>
+            </a:extLst>
+          </a:blip>
+          <a:srcRect l="69104"/>
+          <a:stretch/>
+        </p:blipFill>
+        <p:spPr>
+          <a:xfrm>
+            <a:off x="7985542" y="1973262"/>
+            <a:ext cx="1238930" cy="1209675"/>
+          </a:xfrm>
+          <a:prstGeom prst="rect">
+            <a:avLst/>
+          </a:prstGeom>
+        </p:spPr>
+      </p:pic>
+      <p:pic>
+        <p:nvPicPr>
+          <p:cNvPr id="12" name="Picture 11"/>
+          <p:cNvPicPr>
+            <a:picLocks noChangeAspect="1" noChangeArrowheads="1"/>
+          </p:cNvPicPr>
+          <p:nvPr/>
+        </p:nvPicPr>
+        <p:blipFill>
+          <a:blip r:embed="rId3">
+            <a:extLst>
+              <a:ext uri="{28A0092B-C50C-407E-A947-70E740481C1C}">
+                <a14:useLocalDpi xmlns:a14="http://schemas.microsoft.com/office/drawing/2010/main" val="0"/>
+              </a:ext>
+            </a:extLst>
+          </a:blip>
+          <a:stretch>
+            <a:fillRect/>
+          </a:stretch>
+        </p:blipFill>
+        <p:spPr bwMode="auto">
+          <a:xfrm>
+            <a:off x="9529430" y="1973262"/>
+            <a:ext cx="1072896" cy="1207008"/>
+          </a:xfrm>
+          <a:prstGeom prst="rect">
+            <a:avLst/>
+          </a:prstGeom>
+          <a:noFill/>
+          <a:extLst>
+            <a:ext uri="{909E8E84-426E-40DD-AFC4-6F175D3DCCD1}">
+              <a14:hiddenFill xmlns:a14="http://schemas.microsoft.com/office/drawing/2010/main">
+                <a:solidFill>
+                  <a:srgbClr val="FFFFFF"/>
+                </a:solidFill>
+              </a14:hiddenFill>
+            </a:ext>
+          </a:extLst>
+        </p:spPr>
+      </p:pic>
+      <p:pic>
+        <p:nvPicPr>
+          <p:cNvPr id="13" name="Picture 12"/>
+          <p:cNvPicPr>
+            <a:picLocks noChangeAspect="1" noChangeArrowheads="1"/>
+          </p:cNvPicPr>
+          <p:nvPr/>
+        </p:nvPicPr>
+        <p:blipFill>
+          <a:blip r:embed="rId4">
+            <a:extLst>
+              <a:ext uri="{28A0092B-C50C-407E-A947-70E740481C1C}">
+                <a14:useLocalDpi xmlns:a14="http://schemas.microsoft.com/office/drawing/2010/main" val="0"/>
+              </a:ext>
+            </a:extLst>
+          </a:blip>
+          <a:stretch>
+            <a:fillRect/>
+          </a:stretch>
+        </p:blipFill>
+        <p:spPr bwMode="auto">
+          <a:xfrm>
+            <a:off x="10922407" y="1973262"/>
+            <a:ext cx="1207008" cy="1207008"/>
+          </a:xfrm>
+          <a:prstGeom prst="rect">
+            <a:avLst/>
+          </a:prstGeom>
+          <a:noFill/>
+          <a:extLst>
+            <a:ext uri="{909E8E84-426E-40DD-AFC4-6F175D3DCCD1}">
+              <a14:hiddenFill xmlns:a14="http://schemas.microsoft.com/office/drawing/2010/main">
+                <a:solidFill>
+                  <a:srgbClr val="FFFFFF"/>
+                </a:solidFill>
+              </a14:hiddenFill>
+            </a:ext>
+          </a:extLst>
+        </p:spPr>
+      </p:pic>
+      <p:pic>
+        <p:nvPicPr>
+          <p:cNvPr id="14" name="Picture 13"/>
+          <p:cNvPicPr>
+            <a:picLocks noChangeAspect="1"/>
+          </p:cNvPicPr>
+          <p:nvPr/>
+        </p:nvPicPr>
+        <p:blipFill rotWithShape="1">
+          <a:blip r:embed="rId2">
+            <a:extLst>
+              <a:ext uri="{28A0092B-C50C-407E-A947-70E740481C1C}">
+                <a14:useLocalDpi xmlns:a14="http://schemas.microsoft.com/office/drawing/2010/main" val="0"/>
+              </a:ext>
+            </a:extLst>
+          </a:blip>
+          <a:srcRect r="68646"/>
+          <a:stretch/>
+        </p:blipFill>
+        <p:spPr>
+          <a:xfrm>
+            <a:off x="5048347" y="1973262"/>
+            <a:ext cx="1257300" cy="1209675"/>
+          </a:xfrm>
+          <a:prstGeom prst="rect">
+            <a:avLst/>
+          </a:prstGeom>
+        </p:spPr>
+      </p:pic>
+      <p:pic>
+        <p:nvPicPr>
+          <p:cNvPr id="15" name="Picture 14"/>
+          <p:cNvPicPr>
+            <a:picLocks noChangeAspect="1"/>
+          </p:cNvPicPr>
+          <p:nvPr/>
+        </p:nvPicPr>
+        <p:blipFill rotWithShape="1">
+          <a:blip r:embed="rId2">
+            <a:extLst>
+              <a:ext uri="{28A0092B-C50C-407E-A947-70E740481C1C}">
+                <a14:useLocalDpi xmlns:a14="http://schemas.microsoft.com/office/drawing/2010/main" val="0"/>
+              </a:ext>
+            </a:extLst>
+          </a:blip>
+          <a:srcRect l="34204" r="34442"/>
+          <a:stretch/>
+        </p:blipFill>
+        <p:spPr>
+          <a:xfrm>
+            <a:off x="6516944" y="1973262"/>
+            <a:ext cx="1257301" cy="1209675"/>
+          </a:xfrm>
+          <a:prstGeom prst="rect">
+            <a:avLst/>
+          </a:prstGeom>
+        </p:spPr>
+      </p:pic>
+      <p:sp>
+        <p:nvSpPr>
+          <p:cNvPr id="3" name="TextBox 2"/>
+          <p:cNvSpPr txBox="1"/>
+          <p:nvPr/>
+        </p:nvSpPr>
+        <p:spPr>
+          <a:xfrm>
+            <a:off x="11609" y="3421062"/>
+            <a:ext cx="4937314" cy="849463"/>
+          </a:xfrm>
+          <a:prstGeom prst="rect">
+            <a:avLst/>
+          </a:prstGeom>
+          <a:noFill/>
+        </p:spPr>
+        <p:txBody>
+          <a:bodyPr wrap="none" lIns="182880" tIns="146304" rIns="182880" bIns="146304" rtlCol="0">
+            <a:spAutoFit/>
+          </a:bodyPr>
+          <a:lstStyle/>
+          <a:p>
+            <a:pPr>
+              <a:lnSpc>
+                <a:spcPct val="90000"/>
+              </a:lnSpc>
+              <a:spcAft>
+                <a:spcPts val="600"/>
+              </a:spcAft>
+            </a:pPr>
+            <a:r>
+              <a:rPr lang="en-US" sz="4000" dirty="0">
+                <a:gradFill>
+                  <a:gsLst>
+                    <a:gs pos="2917">
+                      <a:schemeClr val="tx1"/>
+                    </a:gs>
+                    <a:gs pos="30000">
+                      <a:schemeClr val="tx1"/>
+                    </a:gs>
+                  </a:gsLst>
+                  <a:lin ang="5400000" scaled="0"/>
+                </a:gradFill>
+              </a:rPr>
+              <a:t>ADAL Library/Plugin</a:t>
+            </a:r>
+          </a:p>
+        </p:txBody>
+      </p:sp>
+      <p:sp>
+        <p:nvSpPr>
+          <p:cNvPr id="17" name="TextBox 16"/>
+          <p:cNvSpPr txBox="1"/>
+          <p:nvPr/>
+        </p:nvSpPr>
+        <p:spPr>
+          <a:xfrm>
+            <a:off x="1040" y="4270525"/>
+            <a:ext cx="5112297" cy="849463"/>
+          </a:xfrm>
+          <a:prstGeom prst="rect">
+            <a:avLst/>
+          </a:prstGeom>
+          <a:noFill/>
+        </p:spPr>
+        <p:txBody>
+          <a:bodyPr wrap="none" lIns="182880" tIns="146304" rIns="182880" bIns="146304" rtlCol="0">
+            <a:spAutoFit/>
+          </a:bodyPr>
+          <a:lstStyle/>
+          <a:p>
+            <a:pPr>
+              <a:lnSpc>
+                <a:spcPct val="90000"/>
+              </a:lnSpc>
+              <a:spcAft>
+                <a:spcPts val="600"/>
+              </a:spcAft>
+            </a:pPr>
+            <a:r>
+              <a:rPr lang="en-US" sz="4000" dirty="0">
+                <a:gradFill>
+                  <a:gsLst>
+                    <a:gs pos="2917">
+                      <a:schemeClr val="tx1"/>
+                    </a:gs>
+                    <a:gs pos="30000">
+                      <a:schemeClr val="tx1"/>
+                    </a:gs>
+                  </a:gsLst>
+                  <a:lin ang="5400000" scaled="0"/>
+                </a:gradFill>
+              </a:rPr>
+              <a:t>Microsoft Graph SDK</a:t>
+            </a:r>
+          </a:p>
+        </p:txBody>
+      </p:sp>
+      <p:sp>
+        <p:nvSpPr>
+          <p:cNvPr id="5" name="Oval 4"/>
+          <p:cNvSpPr/>
+          <p:nvPr/>
+        </p:nvSpPr>
+        <p:spPr bwMode="auto">
+          <a:xfrm>
+            <a:off x="5362672" y="3531468"/>
+            <a:ext cx="628650" cy="628650"/>
+          </a:xfrm>
+          <a:prstGeom prst="ellipse">
+            <a:avLst/>
+          </a:prstGeom>
+          <a:solidFill>
+            <a:srgbClr val="0093D4"/>
+          </a:solidFill>
+          <a:ln w="57150">
+            <a:solidFill>
+              <a:srgbClr val="0093D4"/>
+            </a:solidFill>
+            <a:headEnd type="none" w="med" len="med"/>
+            <a:tailEnd type="none" w="med" len="med"/>
+          </a:ln>
+          <a:effectLst/>
+        </p:spPr>
+        <p:style>
+          <a:lnRef idx="1">
+            <a:schemeClr val="accent2"/>
+          </a:lnRef>
+          <a:fillRef idx="3">
+            <a:schemeClr val="accent2"/>
+          </a:fillRef>
+          <a:effectRef idx="2">
+            <a:schemeClr val="accent2"/>
+          </a:effectRef>
+          <a:fontRef idx="minor">
+            <a:schemeClr val="lt1"/>
+          </a:fontRef>
+        </p:style>
+        <p:txBody>
+          <a:bodyPr rot="0" spcFirstLastPara="0" vertOverflow="overflow" horzOverflow="overflow" vert="horz" wrap="square" lIns="182880" tIns="146304" rIns="182880" bIns="146304" numCol="1" spcCol="0" rtlCol="0" fromWordArt="0" anchor="t" anchorCtr="0" forceAA="0" compatLnSpc="1">
+            <a:prstTxWarp prst="textNoShape">
+              <a:avLst/>
+            </a:prstTxWarp>
+            <a:noAutofit/>
+          </a:bodyPr>
+          <a:lstStyle/>
+          <a:p>
+            <a:pPr algn="ctr" defTabSz="932472" fontAlgn="base">
+              <a:lnSpc>
+                <a:spcPct val="90000"/>
+              </a:lnSpc>
+              <a:spcBef>
+                <a:spcPct val="0"/>
+              </a:spcBef>
+              <a:spcAft>
+                <a:spcPct val="0"/>
+              </a:spcAft>
+            </a:pPr>
+            <a:endParaRPr lang="en-US" sz="2400" dirty="0" err="1">
+              <a:gradFill>
+                <a:gsLst>
+                  <a:gs pos="0">
+                    <a:srgbClr val="FFFFFF"/>
+                  </a:gs>
+                  <a:gs pos="100000">
+                    <a:srgbClr val="FFFFFF"/>
+                  </a:gs>
+                </a:gsLst>
+                <a:lin ang="5400000" scaled="0"/>
+              </a:gradFill>
+              <a:ea typeface="Segoe UI" pitchFamily="34" charset="0"/>
+              <a:cs typeface="Segoe UI" pitchFamily="34" charset="0"/>
+            </a:endParaRPr>
+          </a:p>
+        </p:txBody>
+      </p:sp>
+      <p:sp>
+        <p:nvSpPr>
+          <p:cNvPr id="20" name="Oval 19"/>
+          <p:cNvSpPr/>
+          <p:nvPr/>
+        </p:nvSpPr>
+        <p:spPr bwMode="auto">
+          <a:xfrm>
+            <a:off x="5362672" y="4380931"/>
+            <a:ext cx="628650" cy="628650"/>
+          </a:xfrm>
+          <a:prstGeom prst="ellipse">
+            <a:avLst/>
+          </a:prstGeom>
+          <a:solidFill>
+            <a:srgbClr val="0093D4"/>
+          </a:solidFill>
+          <a:ln w="57150">
+            <a:solidFill>
+              <a:srgbClr val="0093D4"/>
+            </a:solidFill>
+            <a:headEnd type="none" w="med" len="med"/>
+            <a:tailEnd type="none" w="med" len="med"/>
+          </a:ln>
+          <a:effectLst/>
+        </p:spPr>
+        <p:style>
+          <a:lnRef idx="1">
+            <a:schemeClr val="accent2"/>
+          </a:lnRef>
+          <a:fillRef idx="3">
+            <a:schemeClr val="accent2"/>
+          </a:fillRef>
+          <a:effectRef idx="2">
+            <a:schemeClr val="accent2"/>
+          </a:effectRef>
+          <a:fontRef idx="minor">
+            <a:schemeClr val="lt1"/>
+          </a:fontRef>
+        </p:style>
+        <p:txBody>
+          <a:bodyPr rot="0" spcFirstLastPara="0" vertOverflow="overflow" horzOverflow="overflow" vert="horz" wrap="square" lIns="182880" tIns="146304" rIns="182880" bIns="146304" numCol="1" spcCol="0" rtlCol="0" fromWordArt="0" anchor="t" anchorCtr="0" forceAA="0" compatLnSpc="1">
+            <a:prstTxWarp prst="textNoShape">
+              <a:avLst/>
+            </a:prstTxWarp>
+            <a:noAutofit/>
+          </a:bodyPr>
+          <a:lstStyle/>
+          <a:p>
+            <a:pPr algn="ctr" defTabSz="932472" fontAlgn="base">
+              <a:lnSpc>
+                <a:spcPct val="90000"/>
+              </a:lnSpc>
+              <a:spcBef>
+                <a:spcPct val="0"/>
+              </a:spcBef>
+              <a:spcAft>
+                <a:spcPct val="0"/>
+              </a:spcAft>
+            </a:pPr>
+            <a:endParaRPr lang="en-US" sz="2400" dirty="0" err="1">
+              <a:gradFill>
+                <a:gsLst>
+                  <a:gs pos="0">
+                    <a:srgbClr val="FFFFFF"/>
+                  </a:gs>
+                  <a:gs pos="100000">
+                    <a:srgbClr val="FFFFFF"/>
+                  </a:gs>
+                </a:gsLst>
+                <a:lin ang="5400000" scaled="0"/>
+              </a:gradFill>
+              <a:ea typeface="Segoe UI" pitchFamily="34" charset="0"/>
+              <a:cs typeface="Segoe UI" pitchFamily="34" charset="0"/>
+            </a:endParaRPr>
+          </a:p>
+        </p:txBody>
+      </p:sp>
+      <p:sp>
+        <p:nvSpPr>
+          <p:cNvPr id="21" name="Oval 20"/>
+          <p:cNvSpPr/>
+          <p:nvPr/>
+        </p:nvSpPr>
+        <p:spPr bwMode="auto">
+          <a:xfrm>
+            <a:off x="6831269" y="3531468"/>
+            <a:ext cx="628650" cy="628650"/>
+          </a:xfrm>
+          <a:prstGeom prst="ellipse">
+            <a:avLst/>
+          </a:prstGeom>
+          <a:solidFill>
+            <a:srgbClr val="CCCCCC"/>
+          </a:solidFill>
+          <a:ln w="57150">
+            <a:solidFill>
+              <a:srgbClr val="CCCCCC"/>
+            </a:solidFill>
+            <a:headEnd type="none" w="med" len="med"/>
+            <a:tailEnd type="none" w="med" len="med"/>
+          </a:ln>
+          <a:effectLst/>
+        </p:spPr>
+        <p:style>
+          <a:lnRef idx="1">
+            <a:schemeClr val="accent2"/>
+          </a:lnRef>
+          <a:fillRef idx="3">
+            <a:schemeClr val="accent2"/>
+          </a:fillRef>
+          <a:effectRef idx="2">
+            <a:schemeClr val="accent2"/>
+          </a:effectRef>
+          <a:fontRef idx="minor">
+            <a:schemeClr val="lt1"/>
+          </a:fontRef>
+        </p:style>
+        <p:txBody>
+          <a:bodyPr rot="0" spcFirstLastPara="0" vertOverflow="overflow" horzOverflow="overflow" vert="horz" wrap="square" lIns="182880" tIns="146304" rIns="182880" bIns="146304" numCol="1" spcCol="0" rtlCol="0" fromWordArt="0" anchor="t" anchorCtr="0" forceAA="0" compatLnSpc="1">
+            <a:prstTxWarp prst="textNoShape">
+              <a:avLst/>
+            </a:prstTxWarp>
+            <a:noAutofit/>
+          </a:bodyPr>
+          <a:lstStyle/>
+          <a:p>
+            <a:pPr algn="ctr" defTabSz="932472" fontAlgn="base">
+              <a:lnSpc>
+                <a:spcPct val="90000"/>
+              </a:lnSpc>
+              <a:spcBef>
+                <a:spcPct val="0"/>
+              </a:spcBef>
+              <a:spcAft>
+                <a:spcPct val="0"/>
+              </a:spcAft>
+            </a:pPr>
+            <a:endParaRPr lang="en-US" sz="2400" dirty="0" err="1">
+              <a:gradFill>
+                <a:gsLst>
+                  <a:gs pos="0">
+                    <a:srgbClr val="FFFFFF"/>
+                  </a:gs>
+                  <a:gs pos="100000">
+                    <a:srgbClr val="FFFFFF"/>
+                  </a:gs>
+                </a:gsLst>
+                <a:lin ang="5400000" scaled="0"/>
+              </a:gradFill>
+              <a:ea typeface="Segoe UI" pitchFamily="34" charset="0"/>
+              <a:cs typeface="Segoe UI" pitchFamily="34" charset="0"/>
+            </a:endParaRPr>
+          </a:p>
+        </p:txBody>
+      </p:sp>
+      <p:sp>
+        <p:nvSpPr>
+          <p:cNvPr id="22" name="Oval 21"/>
+          <p:cNvSpPr/>
+          <p:nvPr/>
+        </p:nvSpPr>
+        <p:spPr bwMode="auto">
+          <a:xfrm>
+            <a:off x="6831269" y="4380931"/>
+            <a:ext cx="628650" cy="628650"/>
+          </a:xfrm>
+          <a:prstGeom prst="ellipse">
+            <a:avLst/>
+          </a:prstGeom>
+          <a:solidFill>
+            <a:srgbClr val="CCCCCC"/>
+          </a:solidFill>
+          <a:ln w="57150">
+            <a:solidFill>
+              <a:srgbClr val="CCCCCC"/>
+            </a:solidFill>
+            <a:headEnd type="none" w="med" len="med"/>
+            <a:tailEnd type="none" w="med" len="med"/>
+          </a:ln>
+          <a:effectLst/>
+        </p:spPr>
+        <p:style>
+          <a:lnRef idx="1">
+            <a:schemeClr val="accent2"/>
+          </a:lnRef>
+          <a:fillRef idx="3">
+            <a:schemeClr val="accent2"/>
+          </a:fillRef>
+          <a:effectRef idx="2">
+            <a:schemeClr val="accent2"/>
+          </a:effectRef>
+          <a:fontRef idx="minor">
+            <a:schemeClr val="lt1"/>
+          </a:fontRef>
+        </p:style>
+        <p:txBody>
+          <a:bodyPr rot="0" spcFirstLastPara="0" vertOverflow="overflow" horzOverflow="overflow" vert="horz" wrap="square" lIns="182880" tIns="146304" rIns="182880" bIns="146304" numCol="1" spcCol="0" rtlCol="0" fromWordArt="0" anchor="t" anchorCtr="0" forceAA="0" compatLnSpc="1">
+            <a:prstTxWarp prst="textNoShape">
+              <a:avLst/>
+            </a:prstTxWarp>
+            <a:noAutofit/>
+          </a:bodyPr>
+          <a:lstStyle/>
+          <a:p>
+            <a:pPr algn="ctr" defTabSz="932472" fontAlgn="base">
+              <a:lnSpc>
+                <a:spcPct val="90000"/>
+              </a:lnSpc>
+              <a:spcBef>
+                <a:spcPct val="0"/>
+              </a:spcBef>
+              <a:spcAft>
+                <a:spcPct val="0"/>
+              </a:spcAft>
+            </a:pPr>
+            <a:endParaRPr lang="en-US" sz="2400" dirty="0" err="1">
+              <a:gradFill>
+                <a:gsLst>
+                  <a:gs pos="0">
+                    <a:srgbClr val="FFFFFF"/>
+                  </a:gs>
+                  <a:gs pos="100000">
+                    <a:srgbClr val="FFFFFF"/>
+                  </a:gs>
+                </a:gsLst>
+                <a:lin ang="5400000" scaled="0"/>
+              </a:gradFill>
+              <a:ea typeface="Segoe UI" pitchFamily="34" charset="0"/>
+              <a:cs typeface="Segoe UI" pitchFamily="34" charset="0"/>
+            </a:endParaRPr>
+          </a:p>
+        </p:txBody>
+      </p:sp>
+      <p:sp>
+        <p:nvSpPr>
+          <p:cNvPr id="24" name="Oval 23"/>
+          <p:cNvSpPr/>
+          <p:nvPr/>
+        </p:nvSpPr>
+        <p:spPr bwMode="auto">
+          <a:xfrm>
+            <a:off x="8290682" y="3531468"/>
+            <a:ext cx="628650" cy="628650"/>
+          </a:xfrm>
+          <a:prstGeom prst="ellipse">
+            <a:avLst/>
+          </a:prstGeom>
+          <a:solidFill>
+            <a:srgbClr val="94C83C"/>
+          </a:solidFill>
+          <a:ln w="57150">
+            <a:solidFill>
+              <a:srgbClr val="94C83C"/>
+            </a:solidFill>
+            <a:headEnd type="none" w="med" len="med"/>
+            <a:tailEnd type="none" w="med" len="med"/>
+          </a:ln>
+          <a:effectLst/>
+        </p:spPr>
+        <p:style>
+          <a:lnRef idx="1">
+            <a:schemeClr val="accent2"/>
+          </a:lnRef>
+          <a:fillRef idx="3">
+            <a:schemeClr val="accent2"/>
+          </a:fillRef>
+          <a:effectRef idx="2">
+            <a:schemeClr val="accent2"/>
+          </a:effectRef>
+          <a:fontRef idx="minor">
+            <a:schemeClr val="lt1"/>
+          </a:fontRef>
+        </p:style>
+        <p:txBody>
+          <a:bodyPr rot="0" spcFirstLastPara="0" vertOverflow="overflow" horzOverflow="overflow" vert="horz" wrap="square" lIns="182880" tIns="146304" rIns="182880" bIns="146304" numCol="1" spcCol="0" rtlCol="0" fromWordArt="0" anchor="t" anchorCtr="0" forceAA="0" compatLnSpc="1">
+            <a:prstTxWarp prst="textNoShape">
+              <a:avLst/>
+            </a:prstTxWarp>
+            <a:noAutofit/>
+          </a:bodyPr>
+          <a:lstStyle/>
+          <a:p>
+            <a:pPr algn="ctr" defTabSz="932472" fontAlgn="base">
+              <a:lnSpc>
+                <a:spcPct val="90000"/>
+              </a:lnSpc>
+              <a:spcBef>
+                <a:spcPct val="0"/>
+              </a:spcBef>
+              <a:spcAft>
+                <a:spcPct val="0"/>
+              </a:spcAft>
+            </a:pPr>
+            <a:endParaRPr lang="en-US" sz="2400" dirty="0" err="1">
+              <a:gradFill>
+                <a:gsLst>
+                  <a:gs pos="0">
+                    <a:srgbClr val="FFFFFF"/>
+                  </a:gs>
+                  <a:gs pos="100000">
+                    <a:srgbClr val="FFFFFF"/>
+                  </a:gs>
+                </a:gsLst>
+                <a:lin ang="5400000" scaled="0"/>
+              </a:gradFill>
+              <a:ea typeface="Segoe UI" pitchFamily="34" charset="0"/>
+              <a:cs typeface="Segoe UI" pitchFamily="34" charset="0"/>
+            </a:endParaRPr>
+          </a:p>
+        </p:txBody>
+      </p:sp>
+      <p:sp>
+        <p:nvSpPr>
+          <p:cNvPr id="27" name="Oval 26"/>
+          <p:cNvSpPr/>
+          <p:nvPr/>
+        </p:nvSpPr>
+        <p:spPr bwMode="auto">
+          <a:xfrm>
+            <a:off x="8288304" y="4380931"/>
+            <a:ext cx="628650" cy="628650"/>
+          </a:xfrm>
+          <a:prstGeom prst="ellipse">
+            <a:avLst/>
+          </a:prstGeom>
+          <a:solidFill>
+            <a:srgbClr val="94C83C"/>
+          </a:solidFill>
+          <a:ln w="57150">
+            <a:solidFill>
+              <a:srgbClr val="94C83C"/>
+            </a:solidFill>
+            <a:headEnd type="none" w="med" len="med"/>
+            <a:tailEnd type="none" w="med" len="med"/>
+          </a:ln>
+          <a:effectLst/>
+        </p:spPr>
+        <p:style>
+          <a:lnRef idx="1">
+            <a:schemeClr val="accent2"/>
+          </a:lnRef>
+          <a:fillRef idx="3">
+            <a:schemeClr val="accent2"/>
+          </a:fillRef>
+          <a:effectRef idx="2">
+            <a:schemeClr val="accent2"/>
+          </a:effectRef>
+          <a:fontRef idx="minor">
+            <a:schemeClr val="lt1"/>
+          </a:fontRef>
+        </p:style>
+        <p:txBody>
+          <a:bodyPr rot="0" spcFirstLastPara="0" vertOverflow="overflow" horzOverflow="overflow" vert="horz" wrap="square" lIns="182880" tIns="146304" rIns="182880" bIns="146304" numCol="1" spcCol="0" rtlCol="0" fromWordArt="0" anchor="t" anchorCtr="0" forceAA="0" compatLnSpc="1">
+            <a:prstTxWarp prst="textNoShape">
+              <a:avLst/>
+            </a:prstTxWarp>
+            <a:noAutofit/>
+          </a:bodyPr>
+          <a:lstStyle/>
+          <a:p>
+            <a:pPr algn="ctr" defTabSz="932472" fontAlgn="base">
+              <a:lnSpc>
+                <a:spcPct val="90000"/>
+              </a:lnSpc>
+              <a:spcBef>
+                <a:spcPct val="0"/>
+              </a:spcBef>
+              <a:spcAft>
+                <a:spcPct val="0"/>
+              </a:spcAft>
+            </a:pPr>
+            <a:endParaRPr lang="en-US" sz="2400" dirty="0" err="1">
+              <a:gradFill>
+                <a:gsLst>
+                  <a:gs pos="0">
+                    <a:srgbClr val="FFFFFF"/>
+                  </a:gs>
+                  <a:gs pos="100000">
+                    <a:srgbClr val="FFFFFF"/>
+                  </a:gs>
+                </a:gsLst>
+                <a:lin ang="5400000" scaled="0"/>
+              </a:gradFill>
+              <a:ea typeface="Segoe UI" pitchFamily="34" charset="0"/>
+              <a:cs typeface="Segoe UI" pitchFamily="34" charset="0"/>
+            </a:endParaRPr>
+          </a:p>
+        </p:txBody>
+      </p:sp>
+      <p:sp>
+        <p:nvSpPr>
+          <p:cNvPr id="28" name="Oval 27"/>
+          <p:cNvSpPr/>
+          <p:nvPr/>
+        </p:nvSpPr>
+        <p:spPr bwMode="auto">
+          <a:xfrm>
+            <a:off x="9751553" y="3529835"/>
+            <a:ext cx="628650" cy="628650"/>
+          </a:xfrm>
+          <a:prstGeom prst="ellipse">
+            <a:avLst/>
+          </a:prstGeom>
+          <a:solidFill>
+            <a:srgbClr val="364350"/>
+          </a:solidFill>
+          <a:ln w="57150">
+            <a:solidFill>
+              <a:srgbClr val="364350"/>
+            </a:solidFill>
+            <a:headEnd type="none" w="med" len="med"/>
+            <a:tailEnd type="none" w="med" len="med"/>
+          </a:ln>
+          <a:effectLst/>
+        </p:spPr>
+        <p:style>
+          <a:lnRef idx="1">
+            <a:schemeClr val="accent2"/>
+          </a:lnRef>
+          <a:fillRef idx="3">
+            <a:schemeClr val="accent2"/>
+          </a:fillRef>
+          <a:effectRef idx="2">
+            <a:schemeClr val="accent2"/>
+          </a:effectRef>
+          <a:fontRef idx="minor">
+            <a:schemeClr val="lt1"/>
+          </a:fontRef>
+        </p:style>
+        <p:txBody>
+          <a:bodyPr rot="0" spcFirstLastPara="0" vertOverflow="overflow" horzOverflow="overflow" vert="horz" wrap="square" lIns="182880" tIns="146304" rIns="182880" bIns="146304" numCol="1" spcCol="0" rtlCol="0" fromWordArt="0" anchor="t" anchorCtr="0" forceAA="0" compatLnSpc="1">
+            <a:prstTxWarp prst="textNoShape">
+              <a:avLst/>
+            </a:prstTxWarp>
+            <a:noAutofit/>
+          </a:bodyPr>
+          <a:lstStyle/>
+          <a:p>
+            <a:pPr algn="ctr" defTabSz="932472" fontAlgn="base">
+              <a:lnSpc>
+                <a:spcPct val="90000"/>
+              </a:lnSpc>
+              <a:spcBef>
+                <a:spcPct val="0"/>
+              </a:spcBef>
+              <a:spcAft>
+                <a:spcPct val="0"/>
+              </a:spcAft>
+            </a:pPr>
+            <a:endParaRPr lang="en-US" sz="2400" dirty="0" err="1">
+              <a:gradFill>
+                <a:gsLst>
+                  <a:gs pos="0">
+                    <a:srgbClr val="FFFFFF"/>
+                  </a:gs>
+                  <a:gs pos="100000">
+                    <a:srgbClr val="FFFFFF"/>
+                  </a:gs>
+                </a:gsLst>
+                <a:lin ang="5400000" scaled="0"/>
+              </a:gradFill>
+              <a:ea typeface="Segoe UI" pitchFamily="34" charset="0"/>
+              <a:cs typeface="Segoe UI" pitchFamily="34" charset="0"/>
+            </a:endParaRPr>
+          </a:p>
+        </p:txBody>
+      </p:sp>
+      <p:sp>
+        <p:nvSpPr>
+          <p:cNvPr id="29" name="Oval 28"/>
+          <p:cNvSpPr/>
+          <p:nvPr/>
+        </p:nvSpPr>
+        <p:spPr bwMode="auto">
+          <a:xfrm>
+            <a:off x="9751553" y="4380931"/>
+            <a:ext cx="628650" cy="628650"/>
+          </a:xfrm>
+          <a:prstGeom prst="ellipse">
+            <a:avLst/>
+          </a:prstGeom>
+          <a:noFill/>
+          <a:ln w="57150">
+            <a:solidFill>
+              <a:srgbClr val="364350"/>
+            </a:solidFill>
+            <a:headEnd type="none" w="med" len="med"/>
+            <a:tailEnd type="none" w="med" len="med"/>
+          </a:ln>
+          <a:effectLst/>
+        </p:spPr>
+        <p:style>
+          <a:lnRef idx="1">
+            <a:schemeClr val="accent2"/>
+          </a:lnRef>
+          <a:fillRef idx="3">
+            <a:schemeClr val="accent2"/>
+          </a:fillRef>
+          <a:effectRef idx="2">
+            <a:schemeClr val="accent2"/>
+          </a:effectRef>
+          <a:fontRef idx="minor">
+            <a:schemeClr val="lt1"/>
+          </a:fontRef>
+        </p:style>
+        <p:txBody>
+          <a:bodyPr rot="0" spcFirstLastPara="0" vertOverflow="overflow" horzOverflow="overflow" vert="horz" wrap="square" lIns="182880" tIns="146304" rIns="182880" bIns="146304" numCol="1" spcCol="0" rtlCol="0" fromWordArt="0" anchor="t" anchorCtr="0" forceAA="0" compatLnSpc="1">
+            <a:prstTxWarp prst="textNoShape">
+              <a:avLst/>
+            </a:prstTxWarp>
+            <a:noAutofit/>
+          </a:bodyPr>
+          <a:lstStyle/>
+          <a:p>
+            <a:pPr algn="ctr" defTabSz="932472" fontAlgn="base">
+              <a:lnSpc>
+                <a:spcPct val="90000"/>
+              </a:lnSpc>
+              <a:spcBef>
+                <a:spcPct val="0"/>
+              </a:spcBef>
+              <a:spcAft>
+                <a:spcPct val="0"/>
+              </a:spcAft>
+            </a:pPr>
+            <a:endParaRPr lang="en-US" sz="2400" dirty="0" err="1">
+              <a:gradFill>
+                <a:gsLst>
+                  <a:gs pos="0">
+                    <a:srgbClr val="FFFFFF"/>
+                  </a:gs>
+                  <a:gs pos="100000">
+                    <a:srgbClr val="FFFFFF"/>
+                  </a:gs>
+                </a:gsLst>
+                <a:lin ang="5400000" scaled="0"/>
+              </a:gradFill>
+              <a:ea typeface="Segoe UI" pitchFamily="34" charset="0"/>
+              <a:cs typeface="Segoe UI" pitchFamily="34" charset="0"/>
+            </a:endParaRPr>
+          </a:p>
+        </p:txBody>
+      </p:sp>
+      <p:sp>
+        <p:nvSpPr>
+          <p:cNvPr id="30" name="Oval 29"/>
+          <p:cNvSpPr/>
+          <p:nvPr/>
+        </p:nvSpPr>
+        <p:spPr bwMode="auto">
+          <a:xfrm>
+            <a:off x="11214802" y="3529835"/>
+            <a:ext cx="628650" cy="628650"/>
+          </a:xfrm>
+          <a:prstGeom prst="ellipse">
+            <a:avLst/>
+          </a:prstGeom>
+          <a:solidFill>
+            <a:srgbClr val="2287CA"/>
+          </a:solidFill>
+          <a:ln w="57150">
+            <a:solidFill>
+              <a:srgbClr val="2287CA"/>
+            </a:solidFill>
+            <a:headEnd type="none" w="med" len="med"/>
+            <a:tailEnd type="none" w="med" len="med"/>
+          </a:ln>
+          <a:effectLst/>
+        </p:spPr>
+        <p:style>
+          <a:lnRef idx="1">
+            <a:schemeClr val="accent2"/>
+          </a:lnRef>
+          <a:fillRef idx="3">
+            <a:schemeClr val="accent2"/>
+          </a:fillRef>
+          <a:effectRef idx="2">
+            <a:schemeClr val="accent2"/>
+          </a:effectRef>
+          <a:fontRef idx="minor">
+            <a:schemeClr val="lt1"/>
+          </a:fontRef>
+        </p:style>
+        <p:txBody>
+          <a:bodyPr rot="0" spcFirstLastPara="0" vertOverflow="overflow" horzOverflow="overflow" vert="horz" wrap="square" lIns="182880" tIns="146304" rIns="182880" bIns="146304" numCol="1" spcCol="0" rtlCol="0" fromWordArt="0" anchor="t" anchorCtr="0" forceAA="0" compatLnSpc="1">
+            <a:prstTxWarp prst="textNoShape">
+              <a:avLst/>
+            </a:prstTxWarp>
+            <a:noAutofit/>
+          </a:bodyPr>
+          <a:lstStyle/>
+          <a:p>
+            <a:pPr algn="ctr" defTabSz="932472" fontAlgn="base">
+              <a:lnSpc>
+                <a:spcPct val="90000"/>
+              </a:lnSpc>
+              <a:spcBef>
+                <a:spcPct val="0"/>
+              </a:spcBef>
+              <a:spcAft>
+                <a:spcPct val="0"/>
+              </a:spcAft>
+            </a:pPr>
+            <a:endParaRPr lang="en-US" sz="2400" dirty="0" err="1">
+              <a:gradFill>
+                <a:gsLst>
+                  <a:gs pos="0">
+                    <a:srgbClr val="FFFFFF"/>
+                  </a:gs>
+                  <a:gs pos="100000">
+                    <a:srgbClr val="FFFFFF"/>
+                  </a:gs>
+                </a:gsLst>
+                <a:lin ang="5400000" scaled="0"/>
+              </a:gradFill>
+              <a:ea typeface="Segoe UI" pitchFamily="34" charset="0"/>
+              <a:cs typeface="Segoe UI" pitchFamily="34" charset="0"/>
+            </a:endParaRPr>
+          </a:p>
+        </p:txBody>
+      </p:sp>
+      <p:sp>
+        <p:nvSpPr>
+          <p:cNvPr id="31" name="Oval 30"/>
+          <p:cNvSpPr/>
+          <p:nvPr/>
+        </p:nvSpPr>
+        <p:spPr bwMode="auto">
+          <a:xfrm>
+            <a:off x="11214802" y="4380931"/>
+            <a:ext cx="628650" cy="628650"/>
+          </a:xfrm>
+          <a:prstGeom prst="ellipse">
+            <a:avLst/>
+          </a:prstGeom>
+          <a:solidFill>
+            <a:srgbClr val="2287CA"/>
+          </a:solidFill>
+          <a:ln w="57150">
+            <a:solidFill>
+              <a:srgbClr val="2287CA"/>
+            </a:solidFill>
+            <a:headEnd type="none" w="med" len="med"/>
+            <a:tailEnd type="none" w="med" len="med"/>
+          </a:ln>
+          <a:effectLst/>
+        </p:spPr>
+        <p:style>
+          <a:lnRef idx="1">
+            <a:schemeClr val="accent2"/>
+          </a:lnRef>
+          <a:fillRef idx="3">
+            <a:schemeClr val="accent2"/>
+          </a:fillRef>
+          <a:effectRef idx="2">
+            <a:schemeClr val="accent2"/>
+          </a:effectRef>
+          <a:fontRef idx="minor">
+            <a:schemeClr val="lt1"/>
+          </a:fontRef>
+        </p:style>
+        <p:txBody>
+          <a:bodyPr rot="0" spcFirstLastPara="0" vertOverflow="overflow" horzOverflow="overflow" vert="horz" wrap="square" lIns="182880" tIns="146304" rIns="182880" bIns="146304" numCol="1" spcCol="0" rtlCol="0" fromWordArt="0" anchor="t" anchorCtr="0" forceAA="0" compatLnSpc="1">
+            <a:prstTxWarp prst="textNoShape">
+              <a:avLst/>
+            </a:prstTxWarp>
+            <a:noAutofit/>
+          </a:bodyPr>
+          <a:lstStyle/>
+          <a:p>
+            <a:pPr algn="ctr" defTabSz="932472" fontAlgn="base">
+              <a:lnSpc>
+                <a:spcPct val="90000"/>
+              </a:lnSpc>
+              <a:spcBef>
+                <a:spcPct val="0"/>
+              </a:spcBef>
+              <a:spcAft>
+                <a:spcPct val="0"/>
+              </a:spcAft>
+            </a:pPr>
+            <a:endParaRPr lang="en-US" sz="2400" dirty="0" err="1">
+              <a:gradFill>
+                <a:gsLst>
+                  <a:gs pos="0">
+                    <a:srgbClr val="FFFFFF"/>
+                  </a:gs>
+                  <a:gs pos="100000">
+                    <a:srgbClr val="FFFFFF"/>
+                  </a:gs>
+                </a:gsLst>
+                <a:lin ang="5400000" scaled="0"/>
+              </a:gradFill>
+              <a:ea typeface="Segoe UI" pitchFamily="34" charset="0"/>
+              <a:cs typeface="Segoe UI" pitchFamily="34" charset="0"/>
+            </a:endParaRPr>
+          </a:p>
+        </p:txBody>
+      </p:sp>
+      <p:sp>
+        <p:nvSpPr>
+          <p:cNvPr id="32" name="TextBox 31"/>
+          <p:cNvSpPr txBox="1"/>
+          <p:nvPr/>
+        </p:nvSpPr>
+        <p:spPr>
+          <a:xfrm>
+            <a:off x="18079" y="5119988"/>
+            <a:ext cx="3791744" cy="849463"/>
+          </a:xfrm>
+          <a:prstGeom prst="rect">
+            <a:avLst/>
+          </a:prstGeom>
+          <a:noFill/>
+        </p:spPr>
+        <p:txBody>
+          <a:bodyPr wrap="none" lIns="182880" tIns="146304" rIns="182880" bIns="146304" rtlCol="0">
+            <a:spAutoFit/>
+          </a:bodyPr>
+          <a:lstStyle/>
+          <a:p>
+            <a:pPr>
+              <a:lnSpc>
+                <a:spcPct val="90000"/>
+              </a:lnSpc>
+              <a:spcAft>
+                <a:spcPts val="600"/>
+              </a:spcAft>
+            </a:pPr>
+            <a:r>
+              <a:rPr lang="en-US" sz="4000" dirty="0">
+                <a:gradFill>
+                  <a:gsLst>
+                    <a:gs pos="2917">
+                      <a:schemeClr val="tx1"/>
+                    </a:gs>
+                    <a:gs pos="30000">
+                      <a:schemeClr val="tx1"/>
+                    </a:gs>
+                  </a:gsLst>
+                  <a:lin ang="5400000" scaled="0"/>
+                </a:gradFill>
+              </a:rPr>
+              <a:t>Office 365 APIs</a:t>
+            </a:r>
+          </a:p>
+        </p:txBody>
+      </p:sp>
+      <p:sp>
+        <p:nvSpPr>
+          <p:cNvPr id="33" name="Oval 32"/>
+          <p:cNvSpPr/>
+          <p:nvPr/>
+        </p:nvSpPr>
+        <p:spPr bwMode="auto">
+          <a:xfrm>
+            <a:off x="5362672" y="5226810"/>
+            <a:ext cx="628650" cy="628650"/>
+          </a:xfrm>
+          <a:prstGeom prst="ellipse">
+            <a:avLst/>
+          </a:prstGeom>
+          <a:solidFill>
+            <a:srgbClr val="0093D4"/>
+          </a:solidFill>
+          <a:ln w="57150">
+            <a:solidFill>
+              <a:srgbClr val="0093D4"/>
+            </a:solidFill>
+            <a:headEnd type="none" w="med" len="med"/>
+            <a:tailEnd type="none" w="med" len="med"/>
+          </a:ln>
+          <a:effectLst/>
+        </p:spPr>
+        <p:style>
+          <a:lnRef idx="1">
+            <a:schemeClr val="accent2"/>
+          </a:lnRef>
+          <a:fillRef idx="3">
+            <a:schemeClr val="accent2"/>
+          </a:fillRef>
+          <a:effectRef idx="2">
+            <a:schemeClr val="accent2"/>
+          </a:effectRef>
+          <a:fontRef idx="minor">
+            <a:schemeClr val="lt1"/>
+          </a:fontRef>
+        </p:style>
+        <p:txBody>
+          <a:bodyPr rot="0" spcFirstLastPara="0" vertOverflow="overflow" horzOverflow="overflow" vert="horz" wrap="square" lIns="182880" tIns="146304" rIns="182880" bIns="146304" numCol="1" spcCol="0" rtlCol="0" fromWordArt="0" anchor="t" anchorCtr="0" forceAA="0" compatLnSpc="1">
+            <a:prstTxWarp prst="textNoShape">
+              <a:avLst/>
+            </a:prstTxWarp>
+            <a:noAutofit/>
+          </a:bodyPr>
+          <a:lstStyle/>
+          <a:p>
+            <a:pPr algn="ctr" defTabSz="932472" fontAlgn="base">
+              <a:lnSpc>
+                <a:spcPct val="90000"/>
+              </a:lnSpc>
+              <a:spcBef>
+                <a:spcPct val="0"/>
+              </a:spcBef>
+              <a:spcAft>
+                <a:spcPct val="0"/>
+              </a:spcAft>
+            </a:pPr>
+            <a:endParaRPr lang="en-US" sz="2400" dirty="0" err="1">
+              <a:gradFill>
+                <a:gsLst>
+                  <a:gs pos="0">
+                    <a:srgbClr val="FFFFFF"/>
+                  </a:gs>
+                  <a:gs pos="100000">
+                    <a:srgbClr val="FFFFFF"/>
+                  </a:gs>
+                </a:gsLst>
+                <a:lin ang="5400000" scaled="0"/>
+              </a:gradFill>
+              <a:ea typeface="Segoe UI" pitchFamily="34" charset="0"/>
+              <a:cs typeface="Segoe UI" pitchFamily="34" charset="0"/>
+            </a:endParaRPr>
+          </a:p>
+        </p:txBody>
+      </p:sp>
+      <p:sp>
+        <p:nvSpPr>
+          <p:cNvPr id="34" name="Oval 33"/>
+          <p:cNvSpPr/>
+          <p:nvPr/>
+        </p:nvSpPr>
+        <p:spPr bwMode="auto">
+          <a:xfrm>
+            <a:off x="6831269" y="5226810"/>
+            <a:ext cx="628650" cy="628650"/>
+          </a:xfrm>
+          <a:prstGeom prst="ellipse">
+            <a:avLst/>
+          </a:prstGeom>
+          <a:solidFill>
+            <a:srgbClr val="CCCCCC"/>
+          </a:solidFill>
+          <a:ln w="57150">
+            <a:solidFill>
+              <a:srgbClr val="CCCCCC"/>
+            </a:solidFill>
+            <a:headEnd type="none" w="med" len="med"/>
+            <a:tailEnd type="none" w="med" len="med"/>
+          </a:ln>
+          <a:effectLst/>
+        </p:spPr>
+        <p:style>
+          <a:lnRef idx="1">
+            <a:schemeClr val="accent2"/>
+          </a:lnRef>
+          <a:fillRef idx="3">
+            <a:schemeClr val="accent2"/>
+          </a:fillRef>
+          <a:effectRef idx="2">
+            <a:schemeClr val="accent2"/>
+          </a:effectRef>
+          <a:fontRef idx="minor">
+            <a:schemeClr val="lt1"/>
+          </a:fontRef>
+        </p:style>
+        <p:txBody>
+          <a:bodyPr rot="0" spcFirstLastPara="0" vertOverflow="overflow" horzOverflow="overflow" vert="horz" wrap="square" lIns="182880" tIns="146304" rIns="182880" bIns="146304" numCol="1" spcCol="0" rtlCol="0" fromWordArt="0" anchor="t" anchorCtr="0" forceAA="0" compatLnSpc="1">
+            <a:prstTxWarp prst="textNoShape">
+              <a:avLst/>
+            </a:prstTxWarp>
+            <a:noAutofit/>
+          </a:bodyPr>
+          <a:lstStyle/>
+          <a:p>
+            <a:pPr algn="ctr" defTabSz="932472" fontAlgn="base">
+              <a:lnSpc>
+                <a:spcPct val="90000"/>
+              </a:lnSpc>
+              <a:spcBef>
+                <a:spcPct val="0"/>
+              </a:spcBef>
+              <a:spcAft>
+                <a:spcPct val="0"/>
+              </a:spcAft>
+            </a:pPr>
+            <a:endParaRPr lang="en-US" sz="2400" dirty="0" err="1">
+              <a:gradFill>
+                <a:gsLst>
+                  <a:gs pos="0">
+                    <a:srgbClr val="FFFFFF"/>
+                  </a:gs>
+                  <a:gs pos="100000">
+                    <a:srgbClr val="FFFFFF"/>
+                  </a:gs>
+                </a:gsLst>
+                <a:lin ang="5400000" scaled="0"/>
+              </a:gradFill>
+              <a:ea typeface="Segoe UI" pitchFamily="34" charset="0"/>
+              <a:cs typeface="Segoe UI" pitchFamily="34" charset="0"/>
+            </a:endParaRPr>
+          </a:p>
+        </p:txBody>
+      </p:sp>
+      <p:sp>
+        <p:nvSpPr>
+          <p:cNvPr id="35" name="Oval 34"/>
+          <p:cNvSpPr/>
+          <p:nvPr/>
+        </p:nvSpPr>
+        <p:spPr bwMode="auto">
+          <a:xfrm>
+            <a:off x="8288304" y="5226810"/>
+            <a:ext cx="628650" cy="628650"/>
+          </a:xfrm>
+          <a:prstGeom prst="ellipse">
+            <a:avLst/>
+          </a:prstGeom>
+          <a:solidFill>
+            <a:srgbClr val="94C83C"/>
+          </a:solidFill>
+          <a:ln w="57150">
+            <a:solidFill>
+              <a:srgbClr val="94C83C"/>
+            </a:solidFill>
+            <a:headEnd type="none" w="med" len="med"/>
+            <a:tailEnd type="none" w="med" len="med"/>
+          </a:ln>
+          <a:effectLst/>
+        </p:spPr>
+        <p:style>
+          <a:lnRef idx="1">
+            <a:schemeClr val="accent2"/>
+          </a:lnRef>
+          <a:fillRef idx="3">
+            <a:schemeClr val="accent2"/>
+          </a:fillRef>
+          <a:effectRef idx="2">
+            <a:schemeClr val="accent2"/>
+          </a:effectRef>
+          <a:fontRef idx="minor">
+            <a:schemeClr val="lt1"/>
+          </a:fontRef>
+        </p:style>
+        <p:txBody>
+          <a:bodyPr rot="0" spcFirstLastPara="0" vertOverflow="overflow" horzOverflow="overflow" vert="horz" wrap="square" lIns="182880" tIns="146304" rIns="182880" bIns="146304" numCol="1" spcCol="0" rtlCol="0" fromWordArt="0" anchor="t" anchorCtr="0" forceAA="0" compatLnSpc="1">
+            <a:prstTxWarp prst="textNoShape">
+              <a:avLst/>
+            </a:prstTxWarp>
+            <a:noAutofit/>
+          </a:bodyPr>
+          <a:lstStyle/>
+          <a:p>
+            <a:pPr algn="ctr" defTabSz="932472" fontAlgn="base">
+              <a:lnSpc>
+                <a:spcPct val="90000"/>
+              </a:lnSpc>
+              <a:spcBef>
+                <a:spcPct val="0"/>
+              </a:spcBef>
+              <a:spcAft>
+                <a:spcPct val="0"/>
+              </a:spcAft>
+            </a:pPr>
+            <a:endParaRPr lang="en-US" sz="2400" dirty="0" err="1">
+              <a:gradFill>
+                <a:gsLst>
+                  <a:gs pos="0">
+                    <a:srgbClr val="FFFFFF"/>
+                  </a:gs>
+                  <a:gs pos="100000">
+                    <a:srgbClr val="FFFFFF"/>
+                  </a:gs>
+                </a:gsLst>
+                <a:lin ang="5400000" scaled="0"/>
+              </a:gradFill>
+              <a:ea typeface="Segoe UI" pitchFamily="34" charset="0"/>
+              <a:cs typeface="Segoe UI" pitchFamily="34" charset="0"/>
+            </a:endParaRPr>
+          </a:p>
+        </p:txBody>
+      </p:sp>
+      <p:sp>
+        <p:nvSpPr>
+          <p:cNvPr id="36" name="Oval 35"/>
+          <p:cNvSpPr/>
+          <p:nvPr/>
+        </p:nvSpPr>
+        <p:spPr bwMode="auto">
+          <a:xfrm>
+            <a:off x="9751553" y="5226810"/>
+            <a:ext cx="628650" cy="628650"/>
+          </a:xfrm>
+          <a:prstGeom prst="ellipse">
+            <a:avLst/>
+          </a:prstGeom>
+          <a:solidFill>
+            <a:srgbClr val="364350"/>
+          </a:solidFill>
+          <a:ln w="57150">
+            <a:solidFill>
+              <a:srgbClr val="364350"/>
+            </a:solidFill>
+            <a:headEnd type="none" w="med" len="med"/>
+            <a:tailEnd type="none" w="med" len="med"/>
+          </a:ln>
+          <a:effectLst/>
+        </p:spPr>
+        <p:style>
+          <a:lnRef idx="1">
+            <a:schemeClr val="accent2"/>
+          </a:lnRef>
+          <a:fillRef idx="3">
+            <a:schemeClr val="accent2"/>
+          </a:fillRef>
+          <a:effectRef idx="2">
+            <a:schemeClr val="accent2"/>
+          </a:effectRef>
+          <a:fontRef idx="minor">
+            <a:schemeClr val="lt1"/>
+          </a:fontRef>
+        </p:style>
+        <p:txBody>
+          <a:bodyPr rot="0" spcFirstLastPara="0" vertOverflow="overflow" horzOverflow="overflow" vert="horz" wrap="square" lIns="182880" tIns="146304" rIns="182880" bIns="146304" numCol="1" spcCol="0" rtlCol="0" fromWordArt="0" anchor="t" anchorCtr="0" forceAA="0" compatLnSpc="1">
+            <a:prstTxWarp prst="textNoShape">
+              <a:avLst/>
+            </a:prstTxWarp>
+            <a:noAutofit/>
+          </a:bodyPr>
+          <a:lstStyle/>
+          <a:p>
+            <a:pPr algn="ctr" defTabSz="932472" fontAlgn="base">
+              <a:lnSpc>
+                <a:spcPct val="90000"/>
+              </a:lnSpc>
+              <a:spcBef>
+                <a:spcPct val="0"/>
+              </a:spcBef>
+              <a:spcAft>
+                <a:spcPct val="0"/>
+              </a:spcAft>
+            </a:pPr>
+            <a:endParaRPr lang="en-US" sz="2400" dirty="0" err="1">
+              <a:gradFill>
+                <a:gsLst>
+                  <a:gs pos="0">
+                    <a:srgbClr val="FFFFFF"/>
+                  </a:gs>
+                  <a:gs pos="100000">
+                    <a:srgbClr val="FFFFFF"/>
+                  </a:gs>
+                </a:gsLst>
+                <a:lin ang="5400000" scaled="0"/>
+              </a:gradFill>
+              <a:ea typeface="Segoe UI" pitchFamily="34" charset="0"/>
+              <a:cs typeface="Segoe UI" pitchFamily="34" charset="0"/>
+            </a:endParaRPr>
+          </a:p>
+        </p:txBody>
+      </p:sp>
+      <p:sp>
+        <p:nvSpPr>
+          <p:cNvPr id="37" name="Oval 36"/>
+          <p:cNvSpPr/>
+          <p:nvPr/>
+        </p:nvSpPr>
+        <p:spPr bwMode="auto">
+          <a:xfrm>
+            <a:off x="11214802" y="5226810"/>
+            <a:ext cx="628650" cy="628650"/>
+          </a:xfrm>
+          <a:prstGeom prst="ellipse">
+            <a:avLst/>
+          </a:prstGeom>
+          <a:solidFill>
+            <a:srgbClr val="2287CA"/>
+          </a:solidFill>
+          <a:ln w="57150">
+            <a:solidFill>
+              <a:srgbClr val="2287CA"/>
+            </a:solidFill>
+            <a:headEnd type="none" w="med" len="med"/>
+            <a:tailEnd type="none" w="med" len="med"/>
+          </a:ln>
+          <a:effectLst/>
+        </p:spPr>
+        <p:style>
+          <a:lnRef idx="1">
+            <a:schemeClr val="accent2"/>
+          </a:lnRef>
+          <a:fillRef idx="3">
+            <a:schemeClr val="accent2"/>
+          </a:fillRef>
+          <a:effectRef idx="2">
+            <a:schemeClr val="accent2"/>
+          </a:effectRef>
+          <a:fontRef idx="minor">
+            <a:schemeClr val="lt1"/>
+          </a:fontRef>
+        </p:style>
+        <p:txBody>
+          <a:bodyPr rot="0" spcFirstLastPara="0" vertOverflow="overflow" horzOverflow="overflow" vert="horz" wrap="square" lIns="182880" tIns="146304" rIns="182880" bIns="146304" numCol="1" spcCol="0" rtlCol="0" fromWordArt="0" anchor="t" anchorCtr="0" forceAA="0" compatLnSpc="1">
+            <a:prstTxWarp prst="textNoShape">
+              <a:avLst/>
+            </a:prstTxWarp>
+            <a:noAutofit/>
+          </a:bodyPr>
+          <a:lstStyle/>
+          <a:p>
+            <a:pPr algn="ctr" defTabSz="932472" fontAlgn="base">
+              <a:lnSpc>
+                <a:spcPct val="90000"/>
+              </a:lnSpc>
+              <a:spcBef>
+                <a:spcPct val="0"/>
+              </a:spcBef>
+              <a:spcAft>
+                <a:spcPct val="0"/>
+              </a:spcAft>
+            </a:pPr>
+            <a:endParaRPr lang="en-US" sz="2400" dirty="0" err="1">
+              <a:gradFill>
+                <a:gsLst>
+                  <a:gs pos="0">
+                    <a:srgbClr val="FFFFFF"/>
+                  </a:gs>
+                  <a:gs pos="100000">
+                    <a:srgbClr val="FFFFFF"/>
+                  </a:gs>
+                </a:gsLst>
+                <a:lin ang="5400000" scaled="0"/>
+              </a:gradFill>
+              <a:ea typeface="Segoe UI" pitchFamily="34" charset="0"/>
+              <a:cs typeface="Segoe UI" pitchFamily="34" charset="0"/>
+            </a:endParaRPr>
+          </a:p>
+        </p:txBody>
+      </p:sp>
+    </p:spTree>
+    <p:extLst>
+      <p:ext uri="{BB962C8B-B14F-4D97-AF65-F5344CB8AC3E}">
+        <p14:creationId xmlns:p14="http://schemas.microsoft.com/office/powerpoint/2010/main" val="3422493045"/>
+      </p:ext>
+    </p:extLst>
+  </p:cSld>
+  <p:clrMapOvr>
+    <a:masterClrMapping/>
+  </p:clrMapOvr>
+  <p:transition>
+    <p:fade/>
+  </p:transition>
+</p:sld>
+</file>
+
 <file path=ppt/theme/theme1.xml><?xml version="1.0" encoding="utf-8"?>
 <a:theme xmlns:a="http://schemas.openxmlformats.org/drawingml/2006/main" name="5-30721_Build_2016_Template_Light">
   <a:themeElements>
@@ -53992,15 +53626,6 @@
 </file>
 
 <file path=customXml/item1.xml><?xml version="1.0" encoding="utf-8"?>
-<?mso-contentType ?>
-<FormTemplates xmlns="http://schemas.microsoft.com/sharepoint/v3/contenttype/forms">
-  <Display>DocumentLibraryForm</Display>
-  <Edit>DocumentLibraryForm</Edit>
-  <New>DocumentLibraryForm</New>
-</FormTemplates>
-</file>
-
-<file path=customXml/item2.xml><?xml version="1.0" encoding="utf-8"?>
 <p:properties xmlns:p="http://schemas.microsoft.com/office/2006/metadata/properties" xmlns:xsi="http://www.w3.org/2001/XMLSchema-instance" xmlns:pc="http://schemas.microsoft.com/office/infopath/2007/PartnerControls">
   <documentManagement>
     <SharedWithUsers xmlns="f85c541c-390e-4fa8-b262-5da5c5cfad75">
@@ -54059,7 +53684,7 @@
 </p:properties>
 </file>
 
-<file path=customXml/item3.xml><?xml version="1.0" encoding="utf-8"?>
+<file path=customXml/item2.xml><?xml version="1.0" encoding="utf-8"?>
 <ct:contentTypeSchema xmlns:ct="http://schemas.microsoft.com/office/2006/metadata/contentType" xmlns:ma="http://schemas.microsoft.com/office/2006/metadata/properties/metaAttributes" ct:_="" ma:_="" ma:contentTypeName="Document" ma:contentTypeID="0x010100F50271A20F7B3C41B827A8F04D548019" ma:contentTypeVersion="2" ma:contentTypeDescription="Create a new document." ma:contentTypeScope="" ma:versionID="0f5b4adeca3fa452dfd663ff4e0777e3">
   <xsd:schema xmlns:xsd="http://www.w3.org/2001/XMLSchema" xmlns:xs="http://www.w3.org/2001/XMLSchema" xmlns:p="http://schemas.microsoft.com/office/2006/metadata/properties" xmlns:ns2="f85c541c-390e-4fa8-b262-5da5c5cfad75" targetNamespace="http://schemas.microsoft.com/office/2006/metadata/properties" ma:root="true" ma:fieldsID="592d4a22e1cc7090506e0998bb31d05e" ns2:_="">
     <xsd:import namespace="f85c541c-390e-4fa8-b262-5da5c5cfad75"/>
@@ -54207,15 +53832,16 @@
 </ct:contentTypeSchema>
 </file>
 
-<file path=customXml/itemProps1.xml><?xml version="1.0" encoding="utf-8"?>
-<ds:datastoreItem xmlns:ds="http://schemas.openxmlformats.org/officeDocument/2006/customXml" ds:itemID="{758FDAC0-319D-4A54-8D8E-1D42CB1F8004}">
-  <ds:schemaRefs>
-    <ds:schemaRef ds:uri="http://schemas.microsoft.com/sharepoint/v3/contenttype/forms"/>
-  </ds:schemaRefs>
-</ds:datastoreItem>
+<file path=customXml/item3.xml><?xml version="1.0" encoding="utf-8"?>
+<?mso-contentType ?>
+<FormTemplates xmlns="http://schemas.microsoft.com/sharepoint/v3/contenttype/forms">
+  <Display>DocumentLibraryForm</Display>
+  <Edit>DocumentLibraryForm</Edit>
+  <New>DocumentLibraryForm</New>
+</FormTemplates>
 </file>
 
-<file path=customXml/itemProps2.xml><?xml version="1.0" encoding="utf-8"?>
+<file path=customXml/itemProps1.xml><?xml version="1.0" encoding="utf-8"?>
 <ds:datastoreItem xmlns:ds="http://schemas.openxmlformats.org/officeDocument/2006/customXml" ds:itemID="{F990F116-B58F-4255-B05B-DA3808E0E5C6}">
   <ds:schemaRefs>
     <ds:schemaRef ds:uri="http://purl.org/dc/terms/"/>
@@ -54231,7 +53857,7 @@
 </ds:datastoreItem>
 </file>
 
-<file path=customXml/itemProps3.xml><?xml version="1.0" encoding="utf-8"?>
+<file path=customXml/itemProps2.xml><?xml version="1.0" encoding="utf-8"?>
 <ds:datastoreItem xmlns:ds="http://schemas.openxmlformats.org/officeDocument/2006/customXml" ds:itemID="{16C79B61-263D-4889-954E-B7F93FBE6617}">
   <ds:schemaRefs>
     <ds:schemaRef ds:uri="http://schemas.microsoft.com/office/2006/metadata/contentType"/>
@@ -54247,4 +53873,12 @@
     <ds:schemaRef ds:uri="http://schemas.microsoft.com/internal/obd"/>
   </ds:schemaRefs>
 </ds:datastoreItem>
+</file>
+
+<file path=customXml/itemProps3.xml><?xml version="1.0" encoding="utf-8"?>
+<ds:datastoreItem xmlns:ds="http://schemas.openxmlformats.org/officeDocument/2006/customXml" ds:itemID="{758FDAC0-319D-4A54-8D8E-1D42CB1F8004}">
+  <ds:schemaRefs>
+    <ds:schemaRef ds:uri="http://schemas.microsoft.com/sharepoint/v3/contenttype/forms"/>
+  </ds:schemaRefs>
+</ds:datastoreItem>
 </file>
</xml_diff>